<commit_message>
update lecture 1 materials
</commit_message>
<xml_diff>
--- a/01/DATA515_01_Introduction.pptx
+++ b/01/DATA515_01_Introduction.pptx
@@ -22,21 +22,16 @@
     <p:sldId id="267" r:id="rId17"/>
     <p:sldId id="268" r:id="rId18"/>
     <p:sldId id="269" r:id="rId19"/>
-    <p:sldId id="270" r:id="rId20"/>
-    <p:sldId id="271" r:id="rId21"/>
-    <p:sldId id="272" r:id="rId22"/>
-    <p:sldId id="273" r:id="rId23"/>
-    <p:sldId id="274" r:id="rId24"/>
   </p:sldIdLst>
   <p:sldSz cy="5143500" cx="9144000"/>
   <p:notesSz cx="6858000" cy="9144000"/>
   <p:embeddedFontLst>
     <p:embeddedFont>
       <p:font typeface="Roboto"/>
-      <p:regular r:id="rId25"/>
-      <p:bold r:id="rId26"/>
-      <p:italic r:id="rId27"/>
-      <p:boldItalic r:id="rId28"/>
+      <p:regular r:id="rId20"/>
+      <p:bold r:id="rId21"/>
+      <p:italic r:id="rId22"/>
+      <p:boldItalic r:id="rId23"/>
     </p:embeddedFont>
   </p:embeddedFontLst>
   <p:defaultTextStyle>
@@ -817,7 +812,7 @@
   <p:cSld>
     <p:spTree>
       <p:nvGrpSpPr>
-        <p:cNvPr id="138" name="Shape 138"/>
+        <p:cNvPr id="139" name="Shape 139"/>
         <p:cNvGrpSpPr/>
         <p:nvPr/>
       </p:nvGrpSpPr>
@@ -831,7 +826,7 @@
       </p:grpSpPr>
       <p:sp>
         <p:nvSpPr>
-          <p:cNvPr id="139" name="Google Shape;139;g1c2482a7c5e_0_550:notes"/>
+          <p:cNvPr id="140" name="Google Shape;140;g1c2482a7c5e_0_576:notes"/>
           <p:cNvSpPr/>
           <p:nvPr>
             <p:ph idx="2" type="sldImg"/>
@@ -866,7 +861,7 @@
       </p:sp>
       <p:sp>
         <p:nvSpPr>
-          <p:cNvPr id="140" name="Google Shape;140;g1c2482a7c5e_0_550:notes"/>
+          <p:cNvPr id="141" name="Google Shape;141;g1c2482a7c5e_0_576:notes"/>
           <p:cNvSpPr txBox="1"/>
           <p:nvPr>
             <p:ph idx="1" type="body"/>
@@ -916,7 +911,7 @@
   <p:cSld>
     <p:spTree>
       <p:nvGrpSpPr>
-        <p:cNvPr id="144" name="Shape 144"/>
+        <p:cNvPr id="156" name="Shape 156"/>
         <p:cNvGrpSpPr/>
         <p:nvPr/>
       </p:nvGrpSpPr>
@@ -930,7 +925,7 @@
       </p:grpSpPr>
       <p:sp>
         <p:nvSpPr>
-          <p:cNvPr id="145" name="Google Shape;145;g1c2482a7c5e_0_557:notes"/>
+          <p:cNvPr id="157" name="Google Shape;157;g1c2482a7c5e_0_528:notes"/>
           <p:cNvSpPr/>
           <p:nvPr>
             <p:ph idx="2" type="sldImg"/>
@@ -965,7 +960,7 @@
       </p:sp>
       <p:sp>
         <p:nvSpPr>
-          <p:cNvPr id="146" name="Google Shape;146;g1c2482a7c5e_0_557:notes"/>
+          <p:cNvPr id="158" name="Google Shape;158;g1c2482a7c5e_0_528:notes"/>
           <p:cNvSpPr txBox="1"/>
           <p:nvPr>
             <p:ph idx="1" type="body"/>
@@ -1015,7 +1010,7 @@
   <p:cSld>
     <p:spTree>
       <p:nvGrpSpPr>
-        <p:cNvPr id="150" name="Shape 150"/>
+        <p:cNvPr id="162" name="Shape 162"/>
         <p:cNvGrpSpPr/>
         <p:nvPr/>
       </p:nvGrpSpPr>
@@ -1029,7 +1024,7 @@
       </p:grpSpPr>
       <p:sp>
         <p:nvSpPr>
-          <p:cNvPr id="151" name="Google Shape;151;g1c2482a7c5e_0_576:notes"/>
+          <p:cNvPr id="163" name="Google Shape;163;g1c2482a7c5e_0_521:notes"/>
           <p:cNvSpPr/>
           <p:nvPr>
             <p:ph idx="2" type="sldImg"/>
@@ -1064,7 +1059,7 @@
       </p:sp>
       <p:sp>
         <p:nvSpPr>
-          <p:cNvPr id="152" name="Google Shape;152;g1c2482a7c5e_0_576:notes"/>
+          <p:cNvPr id="164" name="Google Shape;164;g1c2482a7c5e_0_521:notes"/>
           <p:cNvSpPr txBox="1"/>
           <p:nvPr>
             <p:ph idx="1" type="body"/>
@@ -1114,7 +1109,7 @@
   <p:cSld>
     <p:spTree>
       <p:nvGrpSpPr>
-        <p:cNvPr id="167" name="Shape 167"/>
+        <p:cNvPr id="168" name="Shape 168"/>
         <p:cNvGrpSpPr/>
         <p:nvPr/>
       </p:nvGrpSpPr>
@@ -1128,7 +1123,7 @@
       </p:grpSpPr>
       <p:sp>
         <p:nvSpPr>
-          <p:cNvPr id="168" name="Google Shape;168;g1c2482a7c5e_0_564:notes"/>
+          <p:cNvPr id="169" name="Google Shape;169;g1c2482a7c5e_0_509:notes"/>
           <p:cNvSpPr/>
           <p:nvPr>
             <p:ph idx="2" type="sldImg"/>
@@ -1163,7 +1158,7 @@
       </p:sp>
       <p:sp>
         <p:nvSpPr>
-          <p:cNvPr id="169" name="Google Shape;169;g1c2482a7c5e_0_564:notes"/>
+          <p:cNvPr id="170" name="Google Shape;170;g1c2482a7c5e_0_509:notes"/>
           <p:cNvSpPr txBox="1"/>
           <p:nvPr>
             <p:ph idx="1" type="body"/>
@@ -1213,7 +1208,7 @@
   <p:cSld>
     <p:spTree>
       <p:nvGrpSpPr>
-        <p:cNvPr id="173" name="Shape 173"/>
+        <p:cNvPr id="174" name="Shape 174"/>
         <p:cNvGrpSpPr/>
         <p:nvPr/>
       </p:nvGrpSpPr>
@@ -1227,7 +1222,7 @@
       </p:grpSpPr>
       <p:sp>
         <p:nvSpPr>
-          <p:cNvPr id="174" name="Google Shape;174;g1c2482a7c5e_0_570:notes"/>
+          <p:cNvPr id="175" name="Google Shape;175;g1c2482a7c5e_0_514:notes"/>
           <p:cNvSpPr/>
           <p:nvPr>
             <p:ph idx="2" type="sldImg"/>
@@ -1262,502 +1257,7 @@
       </p:sp>
       <p:sp>
         <p:nvSpPr>
-          <p:cNvPr id="175" name="Google Shape;175;g1c2482a7c5e_0_570:notes"/>
-          <p:cNvSpPr txBox="1"/>
-          <p:nvPr>
-            <p:ph idx="1" type="body"/>
-          </p:nvPr>
-        </p:nvSpPr>
-        <p:spPr>
-          <a:xfrm>
-            <a:off x="685800" y="4343400"/>
-            <a:ext cx="5486400" cy="4114800"/>
-          </a:xfrm>
-          <a:prstGeom prst="rect">
-            <a:avLst/>
-          </a:prstGeom>
-        </p:spPr>
-        <p:txBody>
-          <a:bodyPr anchorCtr="0" anchor="t" bIns="91425" lIns="91425" spcFirstLastPara="1" rIns="91425" wrap="square" tIns="91425">
-            <a:noAutofit/>
-          </a:bodyPr>
-          <a:lstStyle/>
-          <a:p>
-            <a:pPr indent="0" lvl="0" marL="0" rtl="0" algn="l">
-              <a:spcBef>
-                <a:spcPts val="0"/>
-              </a:spcBef>
-              <a:spcAft>
-                <a:spcPts val="0"/>
-              </a:spcAft>
-              <a:buNone/>
-            </a:pPr>
-            <a:r>
-              <a:t/>
-            </a:r>
-            <a:endParaRPr/>
-          </a:p>
-        </p:txBody>
-      </p:sp>
-    </p:spTree>
-  </p:cSld>
-  <p:clrMapOvr>
-    <a:masterClrMapping/>
-  </p:clrMapOvr>
-</p:notes>
-</file>
-
-<file path=ppt/notesSlides/notesSlide15.xml><?xml version="1.0" encoding="utf-8"?>
-<p:notes xmlns:a="http://schemas.openxmlformats.org/drawingml/2006/main" xmlns:r="http://schemas.openxmlformats.org/officeDocument/2006/relationships" xmlns:mc="http://schemas.openxmlformats.org/markup-compatibility/2006" xmlns:mv="urn:schemas-microsoft-com:mac:vml" xmlns:p="http://schemas.openxmlformats.org/presentationml/2006/main" xmlns:c="http://schemas.openxmlformats.org/drawingml/2006/chart" xmlns:dgm="http://schemas.openxmlformats.org/drawingml/2006/diagram" xmlns:o="urn:schemas-microsoft-com:office:office" xmlns:v="urn:schemas-microsoft-com:vml" xmlns:pvml="urn:schemas-microsoft-com:office:powerpoint" xmlns:com="http://schemas.openxmlformats.org/drawingml/2006/compatibility" xmlns:p14="http://schemas.microsoft.com/office/powerpoint/2010/main" xmlns:p15="http://schemas.microsoft.com/office/powerpoint/2012/main" xmlns:ahyp="http://schemas.microsoft.com/office/drawing/2018/hyperlinkcolor" showMasterPhAnim="0" showMasterSp="0">
-  <p:cSld>
-    <p:spTree>
-      <p:nvGrpSpPr>
-        <p:cNvPr id="179" name="Shape 179"/>
-        <p:cNvGrpSpPr/>
-        <p:nvPr/>
-      </p:nvGrpSpPr>
-      <p:grpSpPr>
-        <a:xfrm>
-          <a:off x="0" y="0"/>
-          <a:ext cx="0" cy="0"/>
-          <a:chOff x="0" y="0"/>
-          <a:chExt cx="0" cy="0"/>
-        </a:xfrm>
-      </p:grpSpPr>
-      <p:sp>
-        <p:nvSpPr>
-          <p:cNvPr id="180" name="Google Shape;180;g1c2482a7c5e_0_528:notes"/>
-          <p:cNvSpPr/>
-          <p:nvPr>
-            <p:ph idx="2" type="sldImg"/>
-          </p:nvPr>
-        </p:nvSpPr>
-        <p:spPr>
-          <a:xfrm>
-            <a:off x="381300" y="685800"/>
-            <a:ext cx="6096000" cy="3429000"/>
-          </a:xfrm>
-          <a:custGeom>
-            <a:rect b="b" l="l" r="r" t="t"/>
-            <a:pathLst>
-              <a:path extrusionOk="0" h="120000" w="120000">
-                <a:moveTo>
-                  <a:pt x="0" y="0"/>
-                </a:moveTo>
-                <a:lnTo>
-                  <a:pt x="120000" y="0"/>
-                </a:lnTo>
-                <a:lnTo>
-                  <a:pt x="120000" y="120000"/>
-                </a:lnTo>
-                <a:lnTo>
-                  <a:pt x="0" y="120000"/>
-                </a:lnTo>
-                <a:close/>
-              </a:path>
-            </a:pathLst>
-          </a:custGeom>
-        </p:spPr>
-      </p:sp>
-      <p:sp>
-        <p:nvSpPr>
-          <p:cNvPr id="181" name="Google Shape;181;g1c2482a7c5e_0_528:notes"/>
-          <p:cNvSpPr txBox="1"/>
-          <p:nvPr>
-            <p:ph idx="1" type="body"/>
-          </p:nvPr>
-        </p:nvSpPr>
-        <p:spPr>
-          <a:xfrm>
-            <a:off x="685800" y="4343400"/>
-            <a:ext cx="5486400" cy="4114800"/>
-          </a:xfrm>
-          <a:prstGeom prst="rect">
-            <a:avLst/>
-          </a:prstGeom>
-        </p:spPr>
-        <p:txBody>
-          <a:bodyPr anchorCtr="0" anchor="t" bIns="91425" lIns="91425" spcFirstLastPara="1" rIns="91425" wrap="square" tIns="91425">
-            <a:noAutofit/>
-          </a:bodyPr>
-          <a:lstStyle/>
-          <a:p>
-            <a:pPr indent="0" lvl="0" marL="0" rtl="0" algn="l">
-              <a:spcBef>
-                <a:spcPts val="0"/>
-              </a:spcBef>
-              <a:spcAft>
-                <a:spcPts val="0"/>
-              </a:spcAft>
-              <a:buNone/>
-            </a:pPr>
-            <a:r>
-              <a:t/>
-            </a:r>
-            <a:endParaRPr/>
-          </a:p>
-        </p:txBody>
-      </p:sp>
-    </p:spTree>
-  </p:cSld>
-  <p:clrMapOvr>
-    <a:masterClrMapping/>
-  </p:clrMapOvr>
-</p:notes>
-</file>
-
-<file path=ppt/notesSlides/notesSlide16.xml><?xml version="1.0" encoding="utf-8"?>
-<p:notes xmlns:a="http://schemas.openxmlformats.org/drawingml/2006/main" xmlns:r="http://schemas.openxmlformats.org/officeDocument/2006/relationships" xmlns:mc="http://schemas.openxmlformats.org/markup-compatibility/2006" xmlns:mv="urn:schemas-microsoft-com:mac:vml" xmlns:p="http://schemas.openxmlformats.org/presentationml/2006/main" xmlns:c="http://schemas.openxmlformats.org/drawingml/2006/chart" xmlns:dgm="http://schemas.openxmlformats.org/drawingml/2006/diagram" xmlns:o="urn:schemas-microsoft-com:office:office" xmlns:v="urn:schemas-microsoft-com:vml" xmlns:pvml="urn:schemas-microsoft-com:office:powerpoint" xmlns:com="http://schemas.openxmlformats.org/drawingml/2006/compatibility" xmlns:p14="http://schemas.microsoft.com/office/powerpoint/2010/main" xmlns:p15="http://schemas.microsoft.com/office/powerpoint/2012/main" xmlns:ahyp="http://schemas.microsoft.com/office/drawing/2018/hyperlinkcolor" showMasterPhAnim="0" showMasterSp="0">
-  <p:cSld>
-    <p:spTree>
-      <p:nvGrpSpPr>
-        <p:cNvPr id="185" name="Shape 185"/>
-        <p:cNvGrpSpPr/>
-        <p:nvPr/>
-      </p:nvGrpSpPr>
-      <p:grpSpPr>
-        <a:xfrm>
-          <a:off x="0" y="0"/>
-          <a:ext cx="0" cy="0"/>
-          <a:chOff x="0" y="0"/>
-          <a:chExt cx="0" cy="0"/>
-        </a:xfrm>
-      </p:grpSpPr>
-      <p:sp>
-        <p:nvSpPr>
-          <p:cNvPr id="186" name="Google Shape;186;g1c2482a7c5e_0_521:notes"/>
-          <p:cNvSpPr/>
-          <p:nvPr>
-            <p:ph idx="2" type="sldImg"/>
-          </p:nvPr>
-        </p:nvSpPr>
-        <p:spPr>
-          <a:xfrm>
-            <a:off x="381300" y="685800"/>
-            <a:ext cx="6096000" cy="3429000"/>
-          </a:xfrm>
-          <a:custGeom>
-            <a:rect b="b" l="l" r="r" t="t"/>
-            <a:pathLst>
-              <a:path extrusionOk="0" h="120000" w="120000">
-                <a:moveTo>
-                  <a:pt x="0" y="0"/>
-                </a:moveTo>
-                <a:lnTo>
-                  <a:pt x="120000" y="0"/>
-                </a:lnTo>
-                <a:lnTo>
-                  <a:pt x="120000" y="120000"/>
-                </a:lnTo>
-                <a:lnTo>
-                  <a:pt x="0" y="120000"/>
-                </a:lnTo>
-                <a:close/>
-              </a:path>
-            </a:pathLst>
-          </a:custGeom>
-        </p:spPr>
-      </p:sp>
-      <p:sp>
-        <p:nvSpPr>
-          <p:cNvPr id="187" name="Google Shape;187;g1c2482a7c5e_0_521:notes"/>
-          <p:cNvSpPr txBox="1"/>
-          <p:nvPr>
-            <p:ph idx="1" type="body"/>
-          </p:nvPr>
-        </p:nvSpPr>
-        <p:spPr>
-          <a:xfrm>
-            <a:off x="685800" y="4343400"/>
-            <a:ext cx="5486400" cy="4114800"/>
-          </a:xfrm>
-          <a:prstGeom prst="rect">
-            <a:avLst/>
-          </a:prstGeom>
-        </p:spPr>
-        <p:txBody>
-          <a:bodyPr anchorCtr="0" anchor="t" bIns="91425" lIns="91425" spcFirstLastPara="1" rIns="91425" wrap="square" tIns="91425">
-            <a:noAutofit/>
-          </a:bodyPr>
-          <a:lstStyle/>
-          <a:p>
-            <a:pPr indent="0" lvl="0" marL="0" rtl="0" algn="l">
-              <a:spcBef>
-                <a:spcPts val="0"/>
-              </a:spcBef>
-              <a:spcAft>
-                <a:spcPts val="0"/>
-              </a:spcAft>
-              <a:buNone/>
-            </a:pPr>
-            <a:r>
-              <a:t/>
-            </a:r>
-            <a:endParaRPr/>
-          </a:p>
-        </p:txBody>
-      </p:sp>
-    </p:spTree>
-  </p:cSld>
-  <p:clrMapOvr>
-    <a:masterClrMapping/>
-  </p:clrMapOvr>
-</p:notes>
-</file>
-
-<file path=ppt/notesSlides/notesSlide17.xml><?xml version="1.0" encoding="utf-8"?>
-<p:notes xmlns:a="http://schemas.openxmlformats.org/drawingml/2006/main" xmlns:r="http://schemas.openxmlformats.org/officeDocument/2006/relationships" xmlns:mc="http://schemas.openxmlformats.org/markup-compatibility/2006" xmlns:mv="urn:schemas-microsoft-com:mac:vml" xmlns:p="http://schemas.openxmlformats.org/presentationml/2006/main" xmlns:c="http://schemas.openxmlformats.org/drawingml/2006/chart" xmlns:dgm="http://schemas.openxmlformats.org/drawingml/2006/diagram" xmlns:o="urn:schemas-microsoft-com:office:office" xmlns:v="urn:schemas-microsoft-com:vml" xmlns:pvml="urn:schemas-microsoft-com:office:powerpoint" xmlns:com="http://schemas.openxmlformats.org/drawingml/2006/compatibility" xmlns:p14="http://schemas.microsoft.com/office/powerpoint/2010/main" xmlns:p15="http://schemas.microsoft.com/office/powerpoint/2012/main" xmlns:ahyp="http://schemas.microsoft.com/office/drawing/2018/hyperlinkcolor" showMasterPhAnim="0" showMasterSp="0">
-  <p:cSld>
-    <p:spTree>
-      <p:nvGrpSpPr>
-        <p:cNvPr id="191" name="Shape 191"/>
-        <p:cNvGrpSpPr/>
-        <p:nvPr/>
-      </p:nvGrpSpPr>
-      <p:grpSpPr>
-        <a:xfrm>
-          <a:off x="0" y="0"/>
-          <a:ext cx="0" cy="0"/>
-          <a:chOff x="0" y="0"/>
-          <a:chExt cx="0" cy="0"/>
-        </a:xfrm>
-      </p:grpSpPr>
-      <p:sp>
-        <p:nvSpPr>
-          <p:cNvPr id="192" name="Google Shape;192;g1c2482a7c5e_0_503:notes"/>
-          <p:cNvSpPr/>
-          <p:nvPr>
-            <p:ph idx="2" type="sldImg"/>
-          </p:nvPr>
-        </p:nvSpPr>
-        <p:spPr>
-          <a:xfrm>
-            <a:off x="381300" y="685800"/>
-            <a:ext cx="6096000" cy="3429000"/>
-          </a:xfrm>
-          <a:custGeom>
-            <a:rect b="b" l="l" r="r" t="t"/>
-            <a:pathLst>
-              <a:path extrusionOk="0" h="120000" w="120000">
-                <a:moveTo>
-                  <a:pt x="0" y="0"/>
-                </a:moveTo>
-                <a:lnTo>
-                  <a:pt x="120000" y="0"/>
-                </a:lnTo>
-                <a:lnTo>
-                  <a:pt x="120000" y="120000"/>
-                </a:lnTo>
-                <a:lnTo>
-                  <a:pt x="0" y="120000"/>
-                </a:lnTo>
-                <a:close/>
-              </a:path>
-            </a:pathLst>
-          </a:custGeom>
-        </p:spPr>
-      </p:sp>
-      <p:sp>
-        <p:nvSpPr>
-          <p:cNvPr id="193" name="Google Shape;193;g1c2482a7c5e_0_503:notes"/>
-          <p:cNvSpPr txBox="1"/>
-          <p:nvPr>
-            <p:ph idx="1" type="body"/>
-          </p:nvPr>
-        </p:nvSpPr>
-        <p:spPr>
-          <a:xfrm>
-            <a:off x="685800" y="4343400"/>
-            <a:ext cx="5486400" cy="4114800"/>
-          </a:xfrm>
-          <a:prstGeom prst="rect">
-            <a:avLst/>
-          </a:prstGeom>
-        </p:spPr>
-        <p:txBody>
-          <a:bodyPr anchorCtr="0" anchor="t" bIns="91425" lIns="91425" spcFirstLastPara="1" rIns="91425" wrap="square" tIns="91425">
-            <a:noAutofit/>
-          </a:bodyPr>
-          <a:lstStyle/>
-          <a:p>
-            <a:pPr indent="0" lvl="0" marL="0" rtl="0" algn="l">
-              <a:spcBef>
-                <a:spcPts val="0"/>
-              </a:spcBef>
-              <a:spcAft>
-                <a:spcPts val="0"/>
-              </a:spcAft>
-              <a:buNone/>
-            </a:pPr>
-            <a:r>
-              <a:t/>
-            </a:r>
-            <a:endParaRPr/>
-          </a:p>
-        </p:txBody>
-      </p:sp>
-    </p:spTree>
-  </p:cSld>
-  <p:clrMapOvr>
-    <a:masterClrMapping/>
-  </p:clrMapOvr>
-</p:notes>
-</file>
-
-<file path=ppt/notesSlides/notesSlide18.xml><?xml version="1.0" encoding="utf-8"?>
-<p:notes xmlns:a="http://schemas.openxmlformats.org/drawingml/2006/main" xmlns:r="http://schemas.openxmlformats.org/officeDocument/2006/relationships" xmlns:mc="http://schemas.openxmlformats.org/markup-compatibility/2006" xmlns:mv="urn:schemas-microsoft-com:mac:vml" xmlns:p="http://schemas.openxmlformats.org/presentationml/2006/main" xmlns:c="http://schemas.openxmlformats.org/drawingml/2006/chart" xmlns:dgm="http://schemas.openxmlformats.org/drawingml/2006/diagram" xmlns:o="urn:schemas-microsoft-com:office:office" xmlns:v="urn:schemas-microsoft-com:vml" xmlns:pvml="urn:schemas-microsoft-com:office:powerpoint" xmlns:com="http://schemas.openxmlformats.org/drawingml/2006/compatibility" xmlns:p14="http://schemas.microsoft.com/office/powerpoint/2010/main" xmlns:p15="http://schemas.microsoft.com/office/powerpoint/2012/main" xmlns:ahyp="http://schemas.microsoft.com/office/drawing/2018/hyperlinkcolor" showMasterPhAnim="0" showMasterSp="0">
-  <p:cSld>
-    <p:spTree>
-      <p:nvGrpSpPr>
-        <p:cNvPr id="197" name="Shape 197"/>
-        <p:cNvGrpSpPr/>
-        <p:nvPr/>
-      </p:nvGrpSpPr>
-      <p:grpSpPr>
-        <a:xfrm>
-          <a:off x="0" y="0"/>
-          <a:ext cx="0" cy="0"/>
-          <a:chOff x="0" y="0"/>
-          <a:chExt cx="0" cy="0"/>
-        </a:xfrm>
-      </p:grpSpPr>
-      <p:sp>
-        <p:nvSpPr>
-          <p:cNvPr id="198" name="Google Shape;198;g1c2482a7c5e_0_509:notes"/>
-          <p:cNvSpPr/>
-          <p:nvPr>
-            <p:ph idx="2" type="sldImg"/>
-          </p:nvPr>
-        </p:nvSpPr>
-        <p:spPr>
-          <a:xfrm>
-            <a:off x="381300" y="685800"/>
-            <a:ext cx="6096000" cy="3429000"/>
-          </a:xfrm>
-          <a:custGeom>
-            <a:rect b="b" l="l" r="r" t="t"/>
-            <a:pathLst>
-              <a:path extrusionOk="0" h="120000" w="120000">
-                <a:moveTo>
-                  <a:pt x="0" y="0"/>
-                </a:moveTo>
-                <a:lnTo>
-                  <a:pt x="120000" y="0"/>
-                </a:lnTo>
-                <a:lnTo>
-                  <a:pt x="120000" y="120000"/>
-                </a:lnTo>
-                <a:lnTo>
-                  <a:pt x="0" y="120000"/>
-                </a:lnTo>
-                <a:close/>
-              </a:path>
-            </a:pathLst>
-          </a:custGeom>
-        </p:spPr>
-      </p:sp>
-      <p:sp>
-        <p:nvSpPr>
-          <p:cNvPr id="199" name="Google Shape;199;g1c2482a7c5e_0_509:notes"/>
-          <p:cNvSpPr txBox="1"/>
-          <p:nvPr>
-            <p:ph idx="1" type="body"/>
-          </p:nvPr>
-        </p:nvSpPr>
-        <p:spPr>
-          <a:xfrm>
-            <a:off x="685800" y="4343400"/>
-            <a:ext cx="5486400" cy="4114800"/>
-          </a:xfrm>
-          <a:prstGeom prst="rect">
-            <a:avLst/>
-          </a:prstGeom>
-        </p:spPr>
-        <p:txBody>
-          <a:bodyPr anchorCtr="0" anchor="t" bIns="91425" lIns="91425" spcFirstLastPara="1" rIns="91425" wrap="square" tIns="91425">
-            <a:noAutofit/>
-          </a:bodyPr>
-          <a:lstStyle/>
-          <a:p>
-            <a:pPr indent="0" lvl="0" marL="0" rtl="0" algn="l">
-              <a:spcBef>
-                <a:spcPts val="0"/>
-              </a:spcBef>
-              <a:spcAft>
-                <a:spcPts val="0"/>
-              </a:spcAft>
-              <a:buNone/>
-            </a:pPr>
-            <a:r>
-              <a:t/>
-            </a:r>
-            <a:endParaRPr/>
-          </a:p>
-        </p:txBody>
-      </p:sp>
-    </p:spTree>
-  </p:cSld>
-  <p:clrMapOvr>
-    <a:masterClrMapping/>
-  </p:clrMapOvr>
-</p:notes>
-</file>
-
-<file path=ppt/notesSlides/notesSlide19.xml><?xml version="1.0" encoding="utf-8"?>
-<p:notes xmlns:a="http://schemas.openxmlformats.org/drawingml/2006/main" xmlns:r="http://schemas.openxmlformats.org/officeDocument/2006/relationships" xmlns:mc="http://schemas.openxmlformats.org/markup-compatibility/2006" xmlns:mv="urn:schemas-microsoft-com:mac:vml" xmlns:p="http://schemas.openxmlformats.org/presentationml/2006/main" xmlns:c="http://schemas.openxmlformats.org/drawingml/2006/chart" xmlns:dgm="http://schemas.openxmlformats.org/drawingml/2006/diagram" xmlns:o="urn:schemas-microsoft-com:office:office" xmlns:v="urn:schemas-microsoft-com:vml" xmlns:pvml="urn:schemas-microsoft-com:office:powerpoint" xmlns:com="http://schemas.openxmlformats.org/drawingml/2006/compatibility" xmlns:p14="http://schemas.microsoft.com/office/powerpoint/2010/main" xmlns:p15="http://schemas.microsoft.com/office/powerpoint/2012/main" xmlns:ahyp="http://schemas.microsoft.com/office/drawing/2018/hyperlinkcolor" showMasterPhAnim="0" showMasterSp="0">
-  <p:cSld>
-    <p:spTree>
-      <p:nvGrpSpPr>
-        <p:cNvPr id="203" name="Shape 203"/>
-        <p:cNvGrpSpPr/>
-        <p:nvPr/>
-      </p:nvGrpSpPr>
-      <p:grpSpPr>
-        <a:xfrm>
-          <a:off x="0" y="0"/>
-          <a:ext cx="0" cy="0"/>
-          <a:chOff x="0" y="0"/>
-          <a:chExt cx="0" cy="0"/>
-        </a:xfrm>
-      </p:grpSpPr>
-      <p:sp>
-        <p:nvSpPr>
-          <p:cNvPr id="204" name="Google Shape;204;g1c2482a7c5e_0_514:notes"/>
-          <p:cNvSpPr/>
-          <p:nvPr>
-            <p:ph idx="2" type="sldImg"/>
-          </p:nvPr>
-        </p:nvSpPr>
-        <p:spPr>
-          <a:xfrm>
-            <a:off x="381300" y="685800"/>
-            <a:ext cx="6096000" cy="3429000"/>
-          </a:xfrm>
-          <a:custGeom>
-            <a:rect b="b" l="l" r="r" t="t"/>
-            <a:pathLst>
-              <a:path extrusionOk="0" h="120000" w="120000">
-                <a:moveTo>
-                  <a:pt x="0" y="0"/>
-                </a:moveTo>
-                <a:lnTo>
-                  <a:pt x="120000" y="0"/>
-                </a:lnTo>
-                <a:lnTo>
-                  <a:pt x="120000" y="120000"/>
-                </a:lnTo>
-                <a:lnTo>
-                  <a:pt x="0" y="120000"/>
-                </a:lnTo>
-                <a:close/>
-              </a:path>
-            </a:pathLst>
-          </a:custGeom>
-        </p:spPr>
-      </p:sp>
-      <p:sp>
-        <p:nvSpPr>
-          <p:cNvPr id="205" name="Google Shape;205;g1c2482a7c5e_0_514:notes"/>
+          <p:cNvPr id="176" name="Google Shape;176;g1c2482a7c5e_0_514:notes"/>
           <p:cNvSpPr txBox="1"/>
           <p:nvPr>
             <p:ph idx="1" type="body"/>
@@ -1987,7 +1487,7 @@
   <p:cSld>
     <p:spTree>
       <p:nvGrpSpPr>
-        <p:cNvPr id="81" name="Shape 81"/>
+        <p:cNvPr id="82" name="Shape 82"/>
         <p:cNvGrpSpPr/>
         <p:nvPr/>
       </p:nvGrpSpPr>
@@ -2001,7 +1501,7 @@
       </p:grpSpPr>
       <p:sp>
         <p:nvSpPr>
-          <p:cNvPr id="82" name="Google Shape;82;g1c2482a7c5e_0_476:notes"/>
+          <p:cNvPr id="83" name="Google Shape;83;g1c2482a7c5e_0_476:notes"/>
           <p:cNvSpPr/>
           <p:nvPr>
             <p:ph idx="2" type="sldImg"/>
@@ -2036,7 +1536,7 @@
       </p:sp>
       <p:sp>
         <p:nvSpPr>
-          <p:cNvPr id="83" name="Google Shape;83;g1c2482a7c5e_0_476:notes"/>
+          <p:cNvPr id="84" name="Google Shape;84;g1c2482a7c5e_0_476:notes"/>
           <p:cNvSpPr txBox="1"/>
           <p:nvPr>
             <p:ph idx="1" type="body"/>
@@ -2086,7 +1586,7 @@
   <p:cSld>
     <p:spTree>
       <p:nvGrpSpPr>
-        <p:cNvPr id="92" name="Shape 92"/>
+        <p:cNvPr id="93" name="Shape 93"/>
         <p:cNvGrpSpPr/>
         <p:nvPr/>
       </p:nvGrpSpPr>
@@ -2100,7 +1600,7 @@
       </p:grpSpPr>
       <p:sp>
         <p:nvSpPr>
-          <p:cNvPr id="93" name="Google Shape;93;g1c2482a7c5e_0_0:notes"/>
+          <p:cNvPr id="94" name="Google Shape;94;g1c2482a7c5e_0_0:notes"/>
           <p:cNvSpPr/>
           <p:nvPr>
             <p:ph idx="2" type="sldImg"/>
@@ -2135,7 +1635,7 @@
       </p:sp>
       <p:sp>
         <p:nvSpPr>
-          <p:cNvPr id="94" name="Google Shape;94;g1c2482a7c5e_0_0:notes"/>
+          <p:cNvPr id="95" name="Google Shape;95;g1c2482a7c5e_0_0:notes"/>
           <p:cNvSpPr txBox="1"/>
           <p:nvPr>
             <p:ph idx="1" type="body"/>
@@ -2185,7 +1685,7 @@
   <p:cSld>
     <p:spTree>
       <p:nvGrpSpPr>
-        <p:cNvPr id="105" name="Shape 105"/>
+        <p:cNvPr id="106" name="Shape 106"/>
         <p:cNvGrpSpPr/>
         <p:nvPr/>
       </p:nvGrpSpPr>
@@ -2199,7 +1699,7 @@
       </p:grpSpPr>
       <p:sp>
         <p:nvSpPr>
-          <p:cNvPr id="106" name="Google Shape;106;g1c2482a7c5e_0_496:notes"/>
+          <p:cNvPr id="107" name="Google Shape;107;g1c2482a7c5e_0_496:notes"/>
           <p:cNvSpPr/>
           <p:nvPr>
             <p:ph idx="2" type="sldImg"/>
@@ -2234,7 +1734,7 @@
       </p:sp>
       <p:sp>
         <p:nvSpPr>
-          <p:cNvPr id="107" name="Google Shape;107;g1c2482a7c5e_0_496:notes"/>
+          <p:cNvPr id="108" name="Google Shape;108;g1c2482a7c5e_0_496:notes"/>
           <p:cNvSpPr txBox="1"/>
           <p:nvPr>
             <p:ph idx="1" type="body"/>
@@ -2284,7 +1784,7 @@
   <p:cSld>
     <p:spTree>
       <p:nvGrpSpPr>
-        <p:cNvPr id="112" name="Shape 112"/>
+        <p:cNvPr id="113" name="Shape 113"/>
         <p:cNvGrpSpPr/>
         <p:nvPr/>
       </p:nvGrpSpPr>
@@ -2298,7 +1798,7 @@
       </p:grpSpPr>
       <p:sp>
         <p:nvSpPr>
-          <p:cNvPr id="113" name="Google Shape;113;g1bdf60ccdde_0_2:notes"/>
+          <p:cNvPr id="114" name="Google Shape;114;g1bdf60ccdde_0_2:notes"/>
           <p:cNvSpPr/>
           <p:nvPr>
             <p:ph idx="2" type="sldImg"/>
@@ -2333,7 +1833,7 @@
       </p:sp>
       <p:sp>
         <p:nvSpPr>
-          <p:cNvPr id="114" name="Google Shape;114;g1bdf60ccdde_0_2:notes"/>
+          <p:cNvPr id="115" name="Google Shape;115;g1bdf60ccdde_0_2:notes"/>
           <p:cNvSpPr txBox="1"/>
           <p:nvPr>
             <p:ph idx="1" type="body"/>
@@ -2383,7 +1883,7 @@
   <p:cSld>
     <p:spTree>
       <p:nvGrpSpPr>
-        <p:cNvPr id="118" name="Shape 118"/>
+        <p:cNvPr id="119" name="Shape 119"/>
         <p:cNvGrpSpPr/>
         <p:nvPr/>
       </p:nvGrpSpPr>
@@ -2397,7 +1897,7 @@
       </p:grpSpPr>
       <p:sp>
         <p:nvSpPr>
-          <p:cNvPr id="119" name="Google Shape;119;g1c2482a7c5e_0_491:notes"/>
+          <p:cNvPr id="120" name="Google Shape;120;g1c2482a7c5e_0_491:notes"/>
           <p:cNvSpPr/>
           <p:nvPr>
             <p:ph idx="2" type="sldImg"/>
@@ -2432,7 +1932,7 @@
       </p:sp>
       <p:sp>
         <p:nvSpPr>
-          <p:cNvPr id="120" name="Google Shape;120;g1c2482a7c5e_0_491:notes"/>
+          <p:cNvPr id="121" name="Google Shape;121;g1c2482a7c5e_0_491:notes"/>
           <p:cNvSpPr txBox="1"/>
           <p:nvPr>
             <p:ph idx="1" type="body"/>
@@ -2482,7 +1982,7 @@
   <p:cSld>
     <p:spTree>
       <p:nvGrpSpPr>
-        <p:cNvPr id="126" name="Shape 126"/>
+        <p:cNvPr id="127" name="Shape 127"/>
         <p:cNvGrpSpPr/>
         <p:nvPr/>
       </p:nvGrpSpPr>
@@ -2496,7 +1996,7 @@
       </p:grpSpPr>
       <p:sp>
         <p:nvSpPr>
-          <p:cNvPr id="127" name="Google Shape;127;g1c2482a7c5e_0_537:notes"/>
+          <p:cNvPr id="128" name="Google Shape;128;g1c2482a7c5e_0_537:notes"/>
           <p:cNvSpPr/>
           <p:nvPr>
             <p:ph idx="2" type="sldImg"/>
@@ -2531,7 +2031,7 @@
       </p:sp>
       <p:sp>
         <p:nvSpPr>
-          <p:cNvPr id="128" name="Google Shape;128;g1c2482a7c5e_0_537:notes"/>
+          <p:cNvPr id="129" name="Google Shape;129;g1c2482a7c5e_0_537:notes"/>
           <p:cNvSpPr txBox="1"/>
           <p:nvPr>
             <p:ph idx="1" type="body"/>
@@ -2581,7 +2081,7 @@
   <p:cSld>
     <p:spTree>
       <p:nvGrpSpPr>
-        <p:cNvPr id="132" name="Shape 132"/>
+        <p:cNvPr id="133" name="Shape 133"/>
         <p:cNvGrpSpPr/>
         <p:nvPr/>
       </p:nvGrpSpPr>
@@ -2595,7 +2095,7 @@
       </p:grpSpPr>
       <p:sp>
         <p:nvSpPr>
-          <p:cNvPr id="133" name="Google Shape;133;g1c2482a7c5e_0_543:notes"/>
+          <p:cNvPr id="134" name="Google Shape;134;g3221ea022ef_0_73:notes"/>
           <p:cNvSpPr/>
           <p:nvPr>
             <p:ph idx="2" type="sldImg"/>
@@ -2630,7 +2130,7 @@
       </p:sp>
       <p:sp>
         <p:nvSpPr>
-          <p:cNvPr id="134" name="Google Shape;134;g1c2482a7c5e_0_543:notes"/>
+          <p:cNvPr id="135" name="Google Shape;135;g3221ea022ef_0_73:notes"/>
           <p:cNvSpPr txBox="1"/>
           <p:nvPr>
             <p:ph idx="1" type="body"/>
@@ -7924,7 +7424,7 @@
             </a:pPr>
             <a:r>
               <a:rPr lang="en"/>
-              <a:t>January 4, 2024</a:t>
+              <a:t>January 9, 2025</a:t>
             </a:r>
             <a:endParaRPr/>
           </a:p>
@@ -7943,7 +7443,7 @@
   <p:cSld>
     <p:spTree>
       <p:nvGrpSpPr>
-        <p:cNvPr id="141" name="Shape 141"/>
+        <p:cNvPr id="142" name="Shape 142"/>
         <p:cNvGrpSpPr/>
         <p:nvPr/>
       </p:nvGrpSpPr>
@@ -7957,7 +7457,7 @@
       </p:grpSpPr>
       <p:sp>
         <p:nvSpPr>
-          <p:cNvPr id="142" name="Google Shape;142;p22"/>
+          <p:cNvPr id="143" name="Google Shape;143;p22"/>
           <p:cNvSpPr txBox="1"/>
           <p:nvPr>
             <p:ph type="title"/>
@@ -7989,335 +7489,6 @@
             </a:pPr>
             <a:r>
               <a:rPr lang="en"/>
-              <a:t>Project Type 2: Create Reusable Data</a:t>
-            </a:r>
-            <a:endParaRPr/>
-          </a:p>
-        </p:txBody>
-      </p:sp>
-      <p:sp>
-        <p:nvSpPr>
-          <p:cNvPr id="143" name="Google Shape;143;p22"/>
-          <p:cNvSpPr txBox="1"/>
-          <p:nvPr>
-            <p:ph idx="1" type="body"/>
-          </p:nvPr>
-        </p:nvSpPr>
-        <p:spPr>
-          <a:xfrm>
-            <a:off x="311700" y="1152475"/>
-            <a:ext cx="8520600" cy="3416400"/>
-          </a:xfrm>
-          <a:prstGeom prst="rect">
-            <a:avLst/>
-          </a:prstGeom>
-        </p:spPr>
-        <p:txBody>
-          <a:bodyPr anchorCtr="0" anchor="t" bIns="91425" lIns="91425" spcFirstLastPara="1" rIns="91425" wrap="square" tIns="91425">
-            <a:normAutofit/>
-          </a:bodyPr>
-          <a:lstStyle/>
-          <a:p>
-            <a:pPr indent="0" lvl="0" marL="0" rtl="0" algn="l">
-              <a:spcBef>
-                <a:spcPts val="0"/>
-              </a:spcBef>
-              <a:spcAft>
-                <a:spcPts val="0"/>
-              </a:spcAft>
-              <a:buClr>
-                <a:schemeClr val="dk1"/>
-              </a:buClr>
-              <a:buSzPts val="1100"/>
-              <a:buFont typeface="Arial"/>
-              <a:buNone/>
-            </a:pPr>
-            <a:r>
-              <a:rPr lang="en"/>
-              <a:t>Problem statement: Create data repository with tools  (e.g., search, visualization, analytics)</a:t>
-            </a:r>
-            <a:endParaRPr/>
-          </a:p>
-          <a:p>
-            <a:pPr indent="0" lvl="0" marL="0" rtl="0" algn="l">
-              <a:spcBef>
-                <a:spcPts val="1200"/>
-              </a:spcBef>
-              <a:spcAft>
-                <a:spcPts val="0"/>
-              </a:spcAft>
-              <a:buClr>
-                <a:schemeClr val="dk1"/>
-              </a:buClr>
-              <a:buSzPts val="1100"/>
-              <a:buFont typeface="Arial"/>
-              <a:buNone/>
-            </a:pPr>
-            <a:r>
-              <a:rPr lang="en"/>
-              <a:t>Example</a:t>
-            </a:r>
-            <a:endParaRPr/>
-          </a:p>
-          <a:p>
-            <a:pPr indent="0" lvl="0" marL="0" rtl="0" algn="l">
-              <a:spcBef>
-                <a:spcPts val="1200"/>
-              </a:spcBef>
-              <a:spcAft>
-                <a:spcPts val="1200"/>
-              </a:spcAft>
-              <a:buNone/>
-            </a:pPr>
-            <a:r>
-              <a:rPr lang="en" u="sng">
-                <a:solidFill>
-                  <a:schemeClr val="hlink"/>
-                </a:solidFill>
-                <a:hlinkClick r:id="rId3"/>
-              </a:rPr>
-              <a:t>Car2Know</a:t>
-            </a:r>
-            <a:r>
-              <a:rPr lang="en"/>
-              <a:t>: Provide car rental data to users of Car2Go (e.g., for planning trips)</a:t>
-            </a:r>
-            <a:endParaRPr/>
-          </a:p>
-        </p:txBody>
-      </p:sp>
-    </p:spTree>
-  </p:cSld>
-  <p:clrMapOvr>
-    <a:masterClrMapping/>
-  </p:clrMapOvr>
-</p:sld>
-</file>
-
-<file path=ppt/slides/slide11.xml><?xml version="1.0" encoding="utf-8"?>
-<p:sld xmlns:a="http://schemas.openxmlformats.org/drawingml/2006/main" xmlns:r="http://schemas.openxmlformats.org/officeDocument/2006/relationships" xmlns:mc="http://schemas.openxmlformats.org/markup-compatibility/2006" xmlns:mv="urn:schemas-microsoft-com:mac:vml" xmlns:p="http://schemas.openxmlformats.org/presentationml/2006/main" xmlns:c="http://schemas.openxmlformats.org/drawingml/2006/chart" xmlns:dgm="http://schemas.openxmlformats.org/drawingml/2006/diagram" xmlns:o="urn:schemas-microsoft-com:office:office" xmlns:v="urn:schemas-microsoft-com:vml" xmlns:pvml="urn:schemas-microsoft-com:office:powerpoint" xmlns:com="http://schemas.openxmlformats.org/drawingml/2006/compatibility" xmlns:p14="http://schemas.microsoft.com/office/powerpoint/2010/main" xmlns:p15="http://schemas.microsoft.com/office/powerpoint/2012/main" xmlns:ahyp="http://schemas.microsoft.com/office/drawing/2018/hyperlinkcolor">
-  <p:cSld>
-    <p:spTree>
-      <p:nvGrpSpPr>
-        <p:cNvPr id="147" name="Shape 147"/>
-        <p:cNvGrpSpPr/>
-        <p:nvPr/>
-      </p:nvGrpSpPr>
-      <p:grpSpPr>
-        <a:xfrm>
-          <a:off x="0" y="0"/>
-          <a:ext cx="0" cy="0"/>
-          <a:chOff x="0" y="0"/>
-          <a:chExt cx="0" cy="0"/>
-        </a:xfrm>
-      </p:grpSpPr>
-      <p:sp>
-        <p:nvSpPr>
-          <p:cNvPr id="148" name="Google Shape;148;p23"/>
-          <p:cNvSpPr txBox="1"/>
-          <p:nvPr>
-            <p:ph type="title"/>
-          </p:nvPr>
-        </p:nvSpPr>
-        <p:spPr>
-          <a:xfrm>
-            <a:off x="311700" y="445025"/>
-            <a:ext cx="8520600" cy="572700"/>
-          </a:xfrm>
-          <a:prstGeom prst="rect">
-            <a:avLst/>
-          </a:prstGeom>
-        </p:spPr>
-        <p:txBody>
-          <a:bodyPr anchorCtr="0" anchor="t" bIns="91425" lIns="91425" spcFirstLastPara="1" rIns="91425" wrap="square" tIns="91425">
-            <a:normAutofit fontScale="90000"/>
-          </a:bodyPr>
-          <a:lstStyle/>
-          <a:p>
-            <a:pPr indent="0" lvl="0" marL="0" rtl="0" algn="l">
-              <a:spcBef>
-                <a:spcPts val="0"/>
-              </a:spcBef>
-              <a:spcAft>
-                <a:spcPts val="0"/>
-              </a:spcAft>
-              <a:buNone/>
-            </a:pPr>
-            <a:r>
-              <a:rPr lang="en"/>
-              <a:t>Project Type 3: Create a Tool</a:t>
-            </a:r>
-            <a:endParaRPr/>
-          </a:p>
-        </p:txBody>
-      </p:sp>
-      <p:sp>
-        <p:nvSpPr>
-          <p:cNvPr id="149" name="Google Shape;149;p23"/>
-          <p:cNvSpPr txBox="1"/>
-          <p:nvPr>
-            <p:ph idx="1" type="body"/>
-          </p:nvPr>
-        </p:nvSpPr>
-        <p:spPr>
-          <a:xfrm>
-            <a:off x="311700" y="1152475"/>
-            <a:ext cx="8520600" cy="3416400"/>
-          </a:xfrm>
-          <a:prstGeom prst="rect">
-            <a:avLst/>
-          </a:prstGeom>
-        </p:spPr>
-        <p:txBody>
-          <a:bodyPr anchorCtr="0" anchor="t" bIns="91425" lIns="91425" spcFirstLastPara="1" rIns="91425" wrap="square" tIns="91425">
-            <a:normAutofit/>
-          </a:bodyPr>
-          <a:lstStyle/>
-          <a:p>
-            <a:pPr indent="0" lvl="0" marL="0" rtl="0" algn="l">
-              <a:spcBef>
-                <a:spcPts val="0"/>
-              </a:spcBef>
-              <a:spcAft>
-                <a:spcPts val="0"/>
-              </a:spcAft>
-              <a:buClr>
-                <a:schemeClr val="dk1"/>
-              </a:buClr>
-              <a:buSzPts val="1100"/>
-              <a:buFont typeface="Arial"/>
-              <a:buNone/>
-            </a:pPr>
-            <a:r>
-              <a:rPr lang="en"/>
-              <a:t>Problem statement: Solve a problem common to many users</a:t>
-            </a:r>
-            <a:endParaRPr/>
-          </a:p>
-          <a:p>
-            <a:pPr indent="-342900" lvl="0" marL="457200" rtl="0" algn="l">
-              <a:spcBef>
-                <a:spcPts val="1200"/>
-              </a:spcBef>
-              <a:spcAft>
-                <a:spcPts val="0"/>
-              </a:spcAft>
-              <a:buSzPts val="1800"/>
-              <a:buChar char="●"/>
-            </a:pPr>
-            <a:r>
-              <a:rPr lang="en"/>
-              <a:t>Don’t reinvent the wheel</a:t>
-            </a:r>
-            <a:endParaRPr/>
-          </a:p>
-          <a:p>
-            <a:pPr indent="0" lvl="0" marL="0" rtl="0" algn="l">
-              <a:spcBef>
-                <a:spcPts val="1200"/>
-              </a:spcBef>
-              <a:spcAft>
-                <a:spcPts val="0"/>
-              </a:spcAft>
-              <a:buClr>
-                <a:schemeClr val="dk1"/>
-              </a:buClr>
-              <a:buSzPts val="1100"/>
-              <a:buFont typeface="Arial"/>
-              <a:buNone/>
-            </a:pPr>
-            <a:r>
-              <a:rPr lang="en"/>
-              <a:t>Example</a:t>
-            </a:r>
-            <a:endParaRPr/>
-          </a:p>
-          <a:p>
-            <a:pPr indent="0" lvl="0" marL="0" rtl="0" algn="l">
-              <a:spcBef>
-                <a:spcPts val="1200"/>
-              </a:spcBef>
-              <a:spcAft>
-                <a:spcPts val="1200"/>
-              </a:spcAft>
-              <a:buNone/>
-            </a:pPr>
-            <a:r>
-              <a:rPr lang="en" u="sng">
-                <a:solidFill>
-                  <a:schemeClr val="hlink"/>
-                </a:solidFill>
-                <a:hlinkClick r:id="rId3"/>
-              </a:rPr>
-              <a:t>BioReactor Data Logging</a:t>
-            </a:r>
-            <a:r>
-              <a:rPr lang="en"/>
-              <a:t> – Monitor and publish data from BioReactor experiments</a:t>
-            </a:r>
-            <a:endParaRPr/>
-          </a:p>
-        </p:txBody>
-      </p:sp>
-    </p:spTree>
-  </p:cSld>
-  <p:clrMapOvr>
-    <a:masterClrMapping/>
-  </p:clrMapOvr>
-</p:sld>
-</file>
-
-<file path=ppt/slides/slide12.xml><?xml version="1.0" encoding="utf-8"?>
-<p:sld xmlns:a="http://schemas.openxmlformats.org/drawingml/2006/main" xmlns:r="http://schemas.openxmlformats.org/officeDocument/2006/relationships" xmlns:mc="http://schemas.openxmlformats.org/markup-compatibility/2006" xmlns:mv="urn:schemas-microsoft-com:mac:vml" xmlns:p="http://schemas.openxmlformats.org/presentationml/2006/main" xmlns:c="http://schemas.openxmlformats.org/drawingml/2006/chart" xmlns:dgm="http://schemas.openxmlformats.org/drawingml/2006/diagram" xmlns:o="urn:schemas-microsoft-com:office:office" xmlns:v="urn:schemas-microsoft-com:vml" xmlns:pvml="urn:schemas-microsoft-com:office:powerpoint" xmlns:com="http://schemas.openxmlformats.org/drawingml/2006/compatibility" xmlns:p14="http://schemas.microsoft.com/office/powerpoint/2010/main" xmlns:p15="http://schemas.microsoft.com/office/powerpoint/2012/main" xmlns:ahyp="http://schemas.microsoft.com/office/drawing/2018/hyperlinkcolor">
-  <p:cSld>
-    <p:spTree>
-      <p:nvGrpSpPr>
-        <p:cNvPr id="153" name="Shape 153"/>
-        <p:cNvGrpSpPr/>
-        <p:nvPr/>
-      </p:nvGrpSpPr>
-      <p:grpSpPr>
-        <a:xfrm>
-          <a:off x="0" y="0"/>
-          <a:ext cx="0" cy="0"/>
-          <a:chOff x="0" y="0"/>
-          <a:chExt cx="0" cy="0"/>
-        </a:xfrm>
-      </p:grpSpPr>
-      <p:sp>
-        <p:nvSpPr>
-          <p:cNvPr id="154" name="Google Shape;154;p24"/>
-          <p:cNvSpPr txBox="1"/>
-          <p:nvPr>
-            <p:ph type="title"/>
-          </p:nvPr>
-        </p:nvSpPr>
-        <p:spPr>
-          <a:xfrm>
-            <a:off x="311700" y="445025"/>
-            <a:ext cx="8520600" cy="572700"/>
-          </a:xfrm>
-          <a:prstGeom prst="rect">
-            <a:avLst/>
-          </a:prstGeom>
-        </p:spPr>
-        <p:txBody>
-          <a:bodyPr anchorCtr="0" anchor="t" bIns="91425" lIns="91425" spcFirstLastPara="1" rIns="91425" wrap="square" tIns="91425">
-            <a:normAutofit fontScale="90000"/>
-          </a:bodyPr>
-          <a:lstStyle/>
-          <a:p>
-            <a:pPr indent="0" lvl="0" marL="0" rtl="0" algn="l">
-              <a:spcBef>
-                <a:spcPts val="0"/>
-              </a:spcBef>
-              <a:spcAft>
-                <a:spcPts val="0"/>
-              </a:spcAft>
-              <a:buNone/>
-            </a:pPr>
-            <a:r>
-              <a:rPr lang="en"/>
               <a:t>Getting Started</a:t>
             </a:r>
             <a:endParaRPr/>
@@ -8326,7 +7497,7 @@
       </p:sp>
       <p:grpSp>
         <p:nvGrpSpPr>
-          <p:cNvPr id="155" name="Google Shape;155;p24"/>
+          <p:cNvPr id="144" name="Google Shape;144;p22"/>
           <p:cNvGrpSpPr/>
           <p:nvPr/>
         </p:nvGrpSpPr>
@@ -8340,7 +7511,7 @@
         </p:grpSpPr>
         <p:sp>
           <p:nvSpPr>
-            <p:cNvPr id="156" name="Google Shape;156;p24"/>
+            <p:cNvPr id="145" name="Google Shape;145;p22"/>
             <p:cNvSpPr/>
             <p:nvPr/>
           </p:nvSpPr>
@@ -8414,7 +7585,7 @@
         </p:sp>
         <p:sp>
           <p:nvSpPr>
-            <p:cNvPr id="157" name="Google Shape;157;p24"/>
+            <p:cNvPr id="146" name="Google Shape;146;p22"/>
             <p:cNvSpPr txBox="1"/>
             <p:nvPr/>
           </p:nvSpPr>
@@ -8479,7 +7650,7 @@
       </p:grpSp>
       <p:grpSp>
         <p:nvGrpSpPr>
-          <p:cNvPr id="158" name="Google Shape;158;p24"/>
+          <p:cNvPr id="147" name="Google Shape;147;p22"/>
           <p:cNvGrpSpPr/>
           <p:nvPr/>
         </p:nvGrpSpPr>
@@ -8493,7 +7664,7 @@
         </p:grpSpPr>
         <p:sp>
           <p:nvSpPr>
-            <p:cNvPr id="159" name="Google Shape;159;p24"/>
+            <p:cNvPr id="148" name="Google Shape;148;p22"/>
             <p:cNvSpPr/>
             <p:nvPr/>
           </p:nvSpPr>
@@ -8567,7 +7738,7 @@
         </p:sp>
         <p:sp>
           <p:nvSpPr>
-            <p:cNvPr id="160" name="Google Shape;160;p24"/>
+            <p:cNvPr id="149" name="Google Shape;149;p22"/>
             <p:cNvSpPr txBox="1"/>
             <p:nvPr/>
           </p:nvSpPr>
@@ -8623,7 +7794,7 @@
       </p:grpSp>
       <p:grpSp>
         <p:nvGrpSpPr>
-          <p:cNvPr id="161" name="Google Shape;161;p24"/>
+          <p:cNvPr id="150" name="Google Shape;150;p22"/>
           <p:cNvGrpSpPr/>
           <p:nvPr/>
         </p:nvGrpSpPr>
@@ -8637,7 +7808,7 @@
         </p:grpSpPr>
         <p:sp>
           <p:nvSpPr>
-            <p:cNvPr id="162" name="Google Shape;162;p24"/>
+            <p:cNvPr id="151" name="Google Shape;151;p22"/>
             <p:cNvSpPr/>
             <p:nvPr/>
           </p:nvSpPr>
@@ -8711,7 +7882,7 @@
         </p:sp>
         <p:sp>
           <p:nvSpPr>
-            <p:cNvPr id="163" name="Google Shape;163;p24"/>
+            <p:cNvPr id="152" name="Google Shape;152;p22"/>
             <p:cNvSpPr txBox="1"/>
             <p:nvPr/>
           </p:nvSpPr>
@@ -8785,7 +7956,7 @@
       </p:grpSp>
       <p:grpSp>
         <p:nvGrpSpPr>
-          <p:cNvPr id="164" name="Google Shape;164;p24"/>
+          <p:cNvPr id="153" name="Google Shape;153;p22"/>
           <p:cNvGrpSpPr/>
           <p:nvPr/>
         </p:nvGrpSpPr>
@@ -8799,7 +7970,7 @@
         </p:grpSpPr>
         <p:sp>
           <p:nvSpPr>
-            <p:cNvPr id="165" name="Google Shape;165;p24"/>
+            <p:cNvPr id="154" name="Google Shape;154;p22"/>
             <p:cNvSpPr/>
             <p:nvPr/>
           </p:nvSpPr>
@@ -8873,7 +8044,7 @@
         </p:sp>
         <p:sp>
           <p:nvSpPr>
-            <p:cNvPr id="166" name="Google Shape;166;p24"/>
+            <p:cNvPr id="155" name="Google Shape;155;p22"/>
             <p:cNvSpPr txBox="1"/>
             <p:nvPr/>
           </p:nvSpPr>
@@ -8935,12 +8106,12 @@
 </p:sld>
 </file>
 
-<file path=ppt/slides/slide13.xml><?xml version="1.0" encoding="utf-8"?>
+<file path=ppt/slides/slide11.xml><?xml version="1.0" encoding="utf-8"?>
 <p:sld xmlns:a="http://schemas.openxmlformats.org/drawingml/2006/main" xmlns:r="http://schemas.openxmlformats.org/officeDocument/2006/relationships" xmlns:mc="http://schemas.openxmlformats.org/markup-compatibility/2006" xmlns:mv="urn:schemas-microsoft-com:mac:vml" xmlns:p="http://schemas.openxmlformats.org/presentationml/2006/main" xmlns:c="http://schemas.openxmlformats.org/drawingml/2006/chart" xmlns:dgm="http://schemas.openxmlformats.org/drawingml/2006/diagram" xmlns:o="urn:schemas-microsoft-com:office:office" xmlns:v="urn:schemas-microsoft-com:vml" xmlns:pvml="urn:schemas-microsoft-com:office:powerpoint" xmlns:com="http://schemas.openxmlformats.org/drawingml/2006/compatibility" xmlns:p14="http://schemas.microsoft.com/office/powerpoint/2010/main" xmlns:p15="http://schemas.microsoft.com/office/powerpoint/2012/main" xmlns:ahyp="http://schemas.microsoft.com/office/drawing/2018/hyperlinkcolor">
   <p:cSld>
     <p:spTree>
       <p:nvGrpSpPr>
-        <p:cNvPr id="170" name="Shape 170"/>
+        <p:cNvPr id="159" name="Shape 159"/>
         <p:cNvGrpSpPr/>
         <p:nvPr/>
       </p:nvGrpSpPr>
@@ -8954,7 +8125,7 @@
       </p:grpSpPr>
       <p:sp>
         <p:nvSpPr>
-          <p:cNvPr id="171" name="Google Shape;171;p25"/>
+          <p:cNvPr id="160" name="Google Shape;160;p23"/>
           <p:cNvSpPr txBox="1"/>
           <p:nvPr>
             <p:ph type="title"/>
@@ -8986,7 +8157,7 @@
             </a:pPr>
             <a:r>
               <a:rPr lang="en"/>
-              <a:t>Things to Think About</a:t>
+              <a:t>More on the Data</a:t>
             </a:r>
             <a:endParaRPr/>
           </a:p>
@@ -8994,7 +8165,7 @@
       </p:sp>
       <p:sp>
         <p:nvSpPr>
-          <p:cNvPr id="172" name="Google Shape;172;p25"/>
+          <p:cNvPr id="161" name="Google Shape;161;p23"/>
           <p:cNvSpPr txBox="1"/>
           <p:nvPr>
             <p:ph idx="1" type="body"/>
@@ -9015,140 +8186,55 @@
           </a:bodyPr>
           <a:lstStyle/>
           <a:p>
-            <a:pPr indent="-342900" lvl="0" marL="457200" rtl="0" algn="l">
-              <a:spcBef>
-                <a:spcPts val="0"/>
-              </a:spcBef>
-              <a:spcAft>
-                <a:spcPts val="0"/>
-              </a:spcAft>
-              <a:buSzPts val="1800"/>
+            <a:pPr indent="-381000" lvl="0" marL="457200" rtl="0" algn="l">
+              <a:spcBef>
+                <a:spcPts val="0"/>
+              </a:spcBef>
+              <a:spcAft>
+                <a:spcPts val="0"/>
+              </a:spcAft>
+              <a:buSzPts val="2400"/>
               <a:buChar char="●"/>
             </a:pPr>
             <a:r>
-              <a:rPr lang="en"/>
-              <a:t>Topics of interest</a:t>
+              <a:rPr lang="en" sz="2400"/>
+              <a:t>At least two non-trivial data sets</a:t>
             </a:r>
-            <a:endParaRPr/>
+            <a:endParaRPr sz="2400"/>
           </a:p>
           <a:p>
-            <a:pPr indent="-317500" lvl="1" marL="914400" rtl="0" algn="l">
-              <a:spcBef>
-                <a:spcPts val="0"/>
-              </a:spcBef>
-              <a:spcAft>
-                <a:spcPts val="0"/>
-              </a:spcAft>
-              <a:buSzPts val="1400"/>
-              <a:buChar char="○"/>
-            </a:pPr>
-            <a:r>
-              <a:rPr lang="en"/>
-              <a:t>Is there an unmet need (i.e. no code already exists)?</a:t>
-            </a:r>
-            <a:endParaRPr/>
-          </a:p>
-          <a:p>
-            <a:pPr indent="-317500" lvl="1" marL="914400" rtl="0" algn="l">
-              <a:spcBef>
-                <a:spcPts val="0"/>
-              </a:spcBef>
-              <a:spcAft>
-                <a:spcPts val="0"/>
-              </a:spcAft>
-              <a:buSzPts val="1400"/>
-              <a:buChar char="○"/>
-            </a:pPr>
-            <a:r>
-              <a:rPr lang="en"/>
-              <a:t>Is there only commercial software available for a task?</a:t>
-            </a:r>
-            <a:endParaRPr/>
-          </a:p>
-          <a:p>
-            <a:pPr indent="-317500" lvl="1" marL="914400" rtl="0" algn="l">
-              <a:spcBef>
-                <a:spcPts val="0"/>
-              </a:spcBef>
-              <a:spcAft>
-                <a:spcPts val="0"/>
-              </a:spcAft>
-              <a:buSzPts val="1400"/>
-              <a:buChar char="○"/>
-            </a:pPr>
-            <a:r>
-              <a:rPr lang="en"/>
-              <a:t>What is the potential user base?</a:t>
-            </a:r>
-            <a:endParaRPr/>
-          </a:p>
-          <a:p>
-            <a:pPr indent="-342900" lvl="0" marL="457200" rtl="0" algn="l">
-              <a:spcBef>
-                <a:spcPts val="0"/>
-              </a:spcBef>
-              <a:spcAft>
-                <a:spcPts val="0"/>
-              </a:spcAft>
-              <a:buSzPts val="1800"/>
+            <a:pPr indent="-381000" lvl="0" marL="457200" rtl="0" algn="l">
+              <a:spcBef>
+                <a:spcPts val="0"/>
+              </a:spcBef>
+              <a:spcAft>
+                <a:spcPts val="0"/>
+              </a:spcAft>
+              <a:buSzPts val="2400"/>
               <a:buChar char="●"/>
             </a:pPr>
             <a:r>
-              <a:rPr lang="en"/>
-              <a:t>Data you have access to NOW</a:t>
+              <a:rPr lang="en" sz="2400"/>
+              <a:t>Data need to be combined, joined, merged, etc. to answer the scientific questions</a:t>
             </a:r>
-            <a:endParaRPr/>
+            <a:endParaRPr sz="2400"/>
           </a:p>
           <a:p>
-            <a:pPr indent="-317500" lvl="1" marL="914400" rtl="0" algn="l">
-              <a:spcBef>
-                <a:spcPts val="0"/>
-              </a:spcBef>
-              <a:spcAft>
-                <a:spcPts val="0"/>
-              </a:spcAft>
-              <a:buSzPts val="1400"/>
-              <a:buChar char="○"/>
+            <a:pPr indent="-381000" lvl="0" marL="457200" rtl="0" algn="l">
+              <a:spcBef>
+                <a:spcPts val="0"/>
+              </a:spcBef>
+              <a:spcAft>
+                <a:spcPts val="0"/>
+              </a:spcAft>
+              <a:buSzPts val="2400"/>
+              <a:buChar char="●"/>
             </a:pPr>
             <a:r>
-              <a:rPr lang="en"/>
-              <a:t>How much you’ve used the data</a:t>
+              <a:rPr lang="en" sz="2400"/>
+              <a:t>Have access to the data NOW!</a:t>
             </a:r>
-            <a:endParaRPr/>
-          </a:p>
-          <a:p>
-            <a:pPr indent="-317500" lvl="1" marL="914400" rtl="0" algn="l">
-              <a:spcBef>
-                <a:spcPts val="0"/>
-              </a:spcBef>
-              <a:spcAft>
-                <a:spcPts val="0"/>
-              </a:spcAft>
-              <a:buSzPts val="1400"/>
-              <a:buChar char="○"/>
-            </a:pPr>
-            <a:r>
-              <a:rPr lang="en"/>
-              <a:t>Code you have to access the data</a:t>
-            </a:r>
-            <a:endParaRPr/>
-          </a:p>
-          <a:p>
-            <a:pPr indent="-317500" lvl="1" marL="914400" rtl="0" algn="l">
-              <a:spcBef>
-                <a:spcPts val="0"/>
-              </a:spcBef>
-              <a:spcAft>
-                <a:spcPts val="0"/>
-              </a:spcAft>
-              <a:buSzPts val="1400"/>
-              <a:buChar char="○"/>
-            </a:pPr>
-            <a:r>
-              <a:rPr lang="en"/>
-              <a:t>How clean the data are</a:t>
-            </a:r>
-            <a:endParaRPr/>
+            <a:endParaRPr sz="2400"/>
           </a:p>
         </p:txBody>
       </p:sp>
@@ -9160,12 +8246,12 @@
 </p:sld>
 </file>
 
-<file path=ppt/slides/slide14.xml><?xml version="1.0" encoding="utf-8"?>
+<file path=ppt/slides/slide12.xml><?xml version="1.0" encoding="utf-8"?>
 <p:sld xmlns:a="http://schemas.openxmlformats.org/drawingml/2006/main" xmlns:r="http://schemas.openxmlformats.org/officeDocument/2006/relationships" xmlns:mc="http://schemas.openxmlformats.org/markup-compatibility/2006" xmlns:mv="urn:schemas-microsoft-com:mac:vml" xmlns:p="http://schemas.openxmlformats.org/presentationml/2006/main" xmlns:c="http://schemas.openxmlformats.org/drawingml/2006/chart" xmlns:dgm="http://schemas.openxmlformats.org/drawingml/2006/diagram" xmlns:o="urn:schemas-microsoft-com:office:office" xmlns:v="urn:schemas-microsoft-com:vml" xmlns:pvml="urn:schemas-microsoft-com:office:powerpoint" xmlns:com="http://schemas.openxmlformats.org/drawingml/2006/compatibility" xmlns:p14="http://schemas.microsoft.com/office/powerpoint/2010/main" xmlns:p15="http://schemas.microsoft.com/office/powerpoint/2012/main" xmlns:ahyp="http://schemas.microsoft.com/office/drawing/2018/hyperlinkcolor">
   <p:cSld>
     <p:spTree>
       <p:nvGrpSpPr>
-        <p:cNvPr id="176" name="Shape 176"/>
+        <p:cNvPr id="165" name="Shape 165"/>
         <p:cNvGrpSpPr/>
         <p:nvPr/>
       </p:nvGrpSpPr>
@@ -9179,7 +8265,7 @@
       </p:grpSpPr>
       <p:sp>
         <p:nvSpPr>
-          <p:cNvPr id="177" name="Google Shape;177;p26"/>
+          <p:cNvPr id="166" name="Google Shape;166;p24"/>
           <p:cNvSpPr txBox="1"/>
           <p:nvPr>
             <p:ph type="title"/>
@@ -9211,303 +8297,6 @@
             </a:pPr>
             <a:r>
               <a:rPr lang="en"/>
-              <a:t>Verify the Project Idea</a:t>
-            </a:r>
-            <a:endParaRPr/>
-          </a:p>
-        </p:txBody>
-      </p:sp>
-      <p:sp>
-        <p:nvSpPr>
-          <p:cNvPr id="178" name="Google Shape;178;p26"/>
-          <p:cNvSpPr txBox="1"/>
-          <p:nvPr>
-            <p:ph idx="1" type="body"/>
-          </p:nvPr>
-        </p:nvSpPr>
-        <p:spPr>
-          <a:xfrm>
-            <a:off x="311700" y="1152475"/>
-            <a:ext cx="8520600" cy="3416400"/>
-          </a:xfrm>
-          <a:prstGeom prst="rect">
-            <a:avLst/>
-          </a:prstGeom>
-        </p:spPr>
-        <p:txBody>
-          <a:bodyPr anchorCtr="0" anchor="t" bIns="91425" lIns="91425" spcFirstLastPara="1" rIns="91425" wrap="square" tIns="91425">
-            <a:normAutofit/>
-          </a:bodyPr>
-          <a:lstStyle/>
-          <a:p>
-            <a:pPr indent="-381000" lvl="0" marL="457200" rtl="0" algn="l">
-              <a:spcBef>
-                <a:spcPts val="0"/>
-              </a:spcBef>
-              <a:spcAft>
-                <a:spcPts val="0"/>
-              </a:spcAft>
-              <a:buSzPts val="2400"/>
-              <a:buChar char="●"/>
-            </a:pPr>
-            <a:r>
-              <a:rPr lang="en" sz="2400"/>
-              <a:t>Is there an unmet need (i.e. no code already exists)?</a:t>
-            </a:r>
-            <a:endParaRPr sz="2400"/>
-          </a:p>
-          <a:p>
-            <a:pPr indent="-381000" lvl="0" marL="457200" rtl="0" algn="l">
-              <a:spcBef>
-                <a:spcPts val="0"/>
-              </a:spcBef>
-              <a:spcAft>
-                <a:spcPts val="0"/>
-              </a:spcAft>
-              <a:buSzPts val="2400"/>
-              <a:buChar char="●"/>
-            </a:pPr>
-            <a:r>
-              <a:rPr lang="en" sz="2400"/>
-              <a:t>Clarity about the project type?</a:t>
-            </a:r>
-            <a:endParaRPr sz="2400"/>
-          </a:p>
-          <a:p>
-            <a:pPr indent="-381000" lvl="0" marL="457200" rtl="0" algn="l">
-              <a:spcBef>
-                <a:spcPts val="0"/>
-              </a:spcBef>
-              <a:spcAft>
-                <a:spcPts val="0"/>
-              </a:spcAft>
-              <a:buSzPts val="2400"/>
-              <a:buChar char="●"/>
-            </a:pPr>
-            <a:r>
-              <a:rPr lang="en" sz="2400"/>
-              <a:t>Consensus on the problem being solved.</a:t>
-            </a:r>
-            <a:endParaRPr sz="2400"/>
-          </a:p>
-          <a:p>
-            <a:pPr indent="-381000" lvl="0" marL="457200" rtl="0" algn="l">
-              <a:spcBef>
-                <a:spcPts val="0"/>
-              </a:spcBef>
-              <a:spcAft>
-                <a:spcPts val="0"/>
-              </a:spcAft>
-              <a:buSzPts val="2400"/>
-              <a:buChar char="●"/>
-            </a:pPr>
-            <a:r>
-              <a:rPr lang="en" sz="2400"/>
-              <a:t>Do you have data that can solve the problem?</a:t>
-            </a:r>
-            <a:endParaRPr sz="2400"/>
-          </a:p>
-        </p:txBody>
-      </p:sp>
-    </p:spTree>
-  </p:cSld>
-  <p:clrMapOvr>
-    <a:masterClrMapping/>
-  </p:clrMapOvr>
-</p:sld>
-</file>
-
-<file path=ppt/slides/slide15.xml><?xml version="1.0" encoding="utf-8"?>
-<p:sld xmlns:a="http://schemas.openxmlformats.org/drawingml/2006/main" xmlns:r="http://schemas.openxmlformats.org/officeDocument/2006/relationships" xmlns:mc="http://schemas.openxmlformats.org/markup-compatibility/2006" xmlns:mv="urn:schemas-microsoft-com:mac:vml" xmlns:p="http://schemas.openxmlformats.org/presentationml/2006/main" xmlns:c="http://schemas.openxmlformats.org/drawingml/2006/chart" xmlns:dgm="http://schemas.openxmlformats.org/drawingml/2006/diagram" xmlns:o="urn:schemas-microsoft-com:office:office" xmlns:v="urn:schemas-microsoft-com:vml" xmlns:pvml="urn:schemas-microsoft-com:office:powerpoint" xmlns:com="http://schemas.openxmlformats.org/drawingml/2006/compatibility" xmlns:p14="http://schemas.microsoft.com/office/powerpoint/2010/main" xmlns:p15="http://schemas.microsoft.com/office/powerpoint/2012/main" xmlns:ahyp="http://schemas.microsoft.com/office/drawing/2018/hyperlinkcolor">
-  <p:cSld>
-    <p:spTree>
-      <p:nvGrpSpPr>
-        <p:cNvPr id="182" name="Shape 182"/>
-        <p:cNvGrpSpPr/>
-        <p:nvPr/>
-      </p:nvGrpSpPr>
-      <p:grpSpPr>
-        <a:xfrm>
-          <a:off x="0" y="0"/>
-          <a:ext cx="0" cy="0"/>
-          <a:chOff x="0" y="0"/>
-          <a:chExt cx="0" cy="0"/>
-        </a:xfrm>
-      </p:grpSpPr>
-      <p:sp>
-        <p:nvSpPr>
-          <p:cNvPr id="183" name="Google Shape;183;p27"/>
-          <p:cNvSpPr txBox="1"/>
-          <p:nvPr>
-            <p:ph type="title"/>
-          </p:nvPr>
-        </p:nvSpPr>
-        <p:spPr>
-          <a:xfrm>
-            <a:off x="311700" y="445025"/>
-            <a:ext cx="8520600" cy="572700"/>
-          </a:xfrm>
-          <a:prstGeom prst="rect">
-            <a:avLst/>
-          </a:prstGeom>
-        </p:spPr>
-        <p:txBody>
-          <a:bodyPr anchorCtr="0" anchor="t" bIns="91425" lIns="91425" spcFirstLastPara="1" rIns="91425" wrap="square" tIns="91425">
-            <a:normAutofit fontScale="90000"/>
-          </a:bodyPr>
-          <a:lstStyle/>
-          <a:p>
-            <a:pPr indent="0" lvl="0" marL="0" rtl="0" algn="l">
-              <a:spcBef>
-                <a:spcPts val="0"/>
-              </a:spcBef>
-              <a:spcAft>
-                <a:spcPts val="0"/>
-              </a:spcAft>
-              <a:buNone/>
-            </a:pPr>
-            <a:r>
-              <a:rPr lang="en"/>
-              <a:t>More on the Data</a:t>
-            </a:r>
-            <a:endParaRPr/>
-          </a:p>
-        </p:txBody>
-      </p:sp>
-      <p:sp>
-        <p:nvSpPr>
-          <p:cNvPr id="184" name="Google Shape;184;p27"/>
-          <p:cNvSpPr txBox="1"/>
-          <p:nvPr>
-            <p:ph idx="1" type="body"/>
-          </p:nvPr>
-        </p:nvSpPr>
-        <p:spPr>
-          <a:xfrm>
-            <a:off x="311700" y="1152475"/>
-            <a:ext cx="8520600" cy="3416400"/>
-          </a:xfrm>
-          <a:prstGeom prst="rect">
-            <a:avLst/>
-          </a:prstGeom>
-        </p:spPr>
-        <p:txBody>
-          <a:bodyPr anchorCtr="0" anchor="t" bIns="91425" lIns="91425" spcFirstLastPara="1" rIns="91425" wrap="square" tIns="91425">
-            <a:normAutofit/>
-          </a:bodyPr>
-          <a:lstStyle/>
-          <a:p>
-            <a:pPr indent="-381000" lvl="0" marL="457200" rtl="0" algn="l">
-              <a:spcBef>
-                <a:spcPts val="0"/>
-              </a:spcBef>
-              <a:spcAft>
-                <a:spcPts val="0"/>
-              </a:spcAft>
-              <a:buSzPts val="2400"/>
-              <a:buChar char="●"/>
-            </a:pPr>
-            <a:r>
-              <a:rPr lang="en" sz="2400"/>
-              <a:t>At least two non-trivial data sets</a:t>
-            </a:r>
-            <a:endParaRPr sz="2400"/>
-          </a:p>
-          <a:p>
-            <a:pPr indent="-381000" lvl="0" marL="457200" rtl="0" algn="l">
-              <a:spcBef>
-                <a:spcPts val="0"/>
-              </a:spcBef>
-              <a:spcAft>
-                <a:spcPts val="0"/>
-              </a:spcAft>
-              <a:buSzPts val="2400"/>
-              <a:buChar char="●"/>
-            </a:pPr>
-            <a:r>
-              <a:rPr lang="en" sz="2400"/>
-              <a:t>Data need to be combined, joined, merged, etc. to answer the scientific questions</a:t>
-            </a:r>
-            <a:endParaRPr sz="2400"/>
-          </a:p>
-          <a:p>
-            <a:pPr indent="-381000" lvl="0" marL="457200" rtl="0" algn="l">
-              <a:spcBef>
-                <a:spcPts val="0"/>
-              </a:spcBef>
-              <a:spcAft>
-                <a:spcPts val="0"/>
-              </a:spcAft>
-              <a:buSzPts val="2400"/>
-              <a:buChar char="●"/>
-            </a:pPr>
-            <a:r>
-              <a:rPr lang="en" sz="2400"/>
-              <a:t>Have access to the data NOW!</a:t>
-            </a:r>
-            <a:endParaRPr sz="2400"/>
-          </a:p>
-        </p:txBody>
-      </p:sp>
-    </p:spTree>
-  </p:cSld>
-  <p:clrMapOvr>
-    <a:masterClrMapping/>
-  </p:clrMapOvr>
-</p:sld>
-</file>
-
-<file path=ppt/slides/slide16.xml><?xml version="1.0" encoding="utf-8"?>
-<p:sld xmlns:a="http://schemas.openxmlformats.org/drawingml/2006/main" xmlns:r="http://schemas.openxmlformats.org/officeDocument/2006/relationships" xmlns:mc="http://schemas.openxmlformats.org/markup-compatibility/2006" xmlns:mv="urn:schemas-microsoft-com:mac:vml" xmlns:p="http://schemas.openxmlformats.org/presentationml/2006/main" xmlns:c="http://schemas.openxmlformats.org/drawingml/2006/chart" xmlns:dgm="http://schemas.openxmlformats.org/drawingml/2006/diagram" xmlns:o="urn:schemas-microsoft-com:office:office" xmlns:v="urn:schemas-microsoft-com:vml" xmlns:pvml="urn:schemas-microsoft-com:office:powerpoint" xmlns:com="http://schemas.openxmlformats.org/drawingml/2006/compatibility" xmlns:p14="http://schemas.microsoft.com/office/powerpoint/2010/main" xmlns:p15="http://schemas.microsoft.com/office/powerpoint/2012/main" xmlns:ahyp="http://schemas.microsoft.com/office/drawing/2018/hyperlinkcolor">
-  <p:cSld>
-    <p:spTree>
-      <p:nvGrpSpPr>
-        <p:cNvPr id="188" name="Shape 188"/>
-        <p:cNvGrpSpPr/>
-        <p:nvPr/>
-      </p:nvGrpSpPr>
-      <p:grpSpPr>
-        <a:xfrm>
-          <a:off x="0" y="0"/>
-          <a:ext cx="0" cy="0"/>
-          <a:chOff x="0" y="0"/>
-          <a:chExt cx="0" cy="0"/>
-        </a:xfrm>
-      </p:grpSpPr>
-      <p:sp>
-        <p:nvSpPr>
-          <p:cNvPr id="189" name="Google Shape;189;p28"/>
-          <p:cNvSpPr txBox="1"/>
-          <p:nvPr>
-            <p:ph type="title"/>
-          </p:nvPr>
-        </p:nvSpPr>
-        <p:spPr>
-          <a:xfrm>
-            <a:off x="311700" y="445025"/>
-            <a:ext cx="8520600" cy="572700"/>
-          </a:xfrm>
-          <a:prstGeom prst="rect">
-            <a:avLst/>
-          </a:prstGeom>
-        </p:spPr>
-        <p:txBody>
-          <a:bodyPr anchorCtr="0" anchor="t" bIns="91425" lIns="91425" spcFirstLastPara="1" rIns="91425" wrap="square" tIns="91425">
-            <a:normAutofit fontScale="90000"/>
-          </a:bodyPr>
-          <a:lstStyle/>
-          <a:p>
-            <a:pPr indent="0" lvl="0" marL="0" rtl="0" algn="l">
-              <a:spcBef>
-                <a:spcPts val="0"/>
-              </a:spcBef>
-              <a:spcAft>
-                <a:spcPts val="0"/>
-              </a:spcAft>
-              <a:buNone/>
-            </a:pPr>
-            <a:r>
-              <a:rPr lang="en"/>
               <a:t>Some Public Data</a:t>
             </a:r>
             <a:endParaRPr/>
@@ -9516,7 +8305,7 @@
       </p:sp>
       <p:sp>
         <p:nvSpPr>
-          <p:cNvPr id="190" name="Google Shape;190;p28"/>
+          <p:cNvPr id="167" name="Google Shape;167;p24"/>
           <p:cNvSpPr txBox="1"/>
           <p:nvPr>
             <p:ph idx="1" type="body"/>
@@ -9777,12 +8566,12 @@
 </p:sld>
 </file>
 
-<file path=ppt/slides/slide17.xml><?xml version="1.0" encoding="utf-8"?>
+<file path=ppt/slides/slide13.xml><?xml version="1.0" encoding="utf-8"?>
 <p:sld xmlns:a="http://schemas.openxmlformats.org/drawingml/2006/main" xmlns:r="http://schemas.openxmlformats.org/officeDocument/2006/relationships" xmlns:mc="http://schemas.openxmlformats.org/markup-compatibility/2006" xmlns:mv="urn:schemas-microsoft-com:mac:vml" xmlns:p="http://schemas.openxmlformats.org/presentationml/2006/main" xmlns:c="http://schemas.openxmlformats.org/drawingml/2006/chart" xmlns:dgm="http://schemas.openxmlformats.org/drawingml/2006/diagram" xmlns:o="urn:schemas-microsoft-com:office:office" xmlns:v="urn:schemas-microsoft-com:vml" xmlns:pvml="urn:schemas-microsoft-com:office:powerpoint" xmlns:com="http://schemas.openxmlformats.org/drawingml/2006/compatibility" xmlns:p14="http://schemas.microsoft.com/office/powerpoint/2010/main" xmlns:p15="http://schemas.microsoft.com/office/powerpoint/2012/main" xmlns:ahyp="http://schemas.microsoft.com/office/drawing/2018/hyperlinkcolor">
   <p:cSld>
     <p:spTree>
       <p:nvGrpSpPr>
-        <p:cNvPr id="194" name="Shape 194"/>
+        <p:cNvPr id="171" name="Shape 171"/>
         <p:cNvGrpSpPr/>
         <p:nvPr/>
       </p:nvGrpSpPr>
@@ -9796,7 +8585,7 @@
       </p:grpSpPr>
       <p:sp>
         <p:nvSpPr>
-          <p:cNvPr id="195" name="Google Shape;195;p29"/>
+          <p:cNvPr id="172" name="Google Shape;172;p25"/>
           <p:cNvSpPr txBox="1"/>
           <p:nvPr>
             <p:ph type="title"/>
@@ -9828,7 +8617,7 @@
             </a:pPr>
             <a:r>
               <a:rPr lang="en"/>
-              <a:t>Data! Data! Data!</a:t>
+              <a:t>Project Ideation</a:t>
             </a:r>
             <a:endParaRPr/>
           </a:p>
@@ -9836,7 +8625,7 @@
       </p:sp>
       <p:sp>
         <p:nvSpPr>
-          <p:cNvPr id="196" name="Google Shape;196;p29"/>
+          <p:cNvPr id="173" name="Google Shape;173;p25"/>
           <p:cNvSpPr txBox="1"/>
           <p:nvPr>
             <p:ph idx="1" type="body"/>
@@ -9857,9 +8646,25 @@
           </a:bodyPr>
           <a:lstStyle/>
           <a:p>
+            <a:pPr indent="0" lvl="0" marL="0" rtl="0" algn="l">
+              <a:spcBef>
+                <a:spcPts val="0"/>
+              </a:spcBef>
+              <a:spcAft>
+                <a:spcPts val="0"/>
+              </a:spcAft>
+              <a:buNone/>
+            </a:pPr>
+            <a:r>
+              <a:rPr lang="en"/>
+              <a:t>Over the first few weeks:</a:t>
+            </a:r>
+            <a:endParaRPr/>
+          </a:p>
+          <a:p>
             <a:pPr indent="-342900" lvl="0" marL="457200" rtl="0" algn="l">
               <a:spcBef>
-                <a:spcPts val="0"/>
+                <a:spcPts val="1200"/>
               </a:spcBef>
               <a:spcAft>
                 <a:spcPts val="0"/>
@@ -9869,7 +8674,7 @@
             </a:pPr>
             <a:r>
               <a:rPr lang="en"/>
-              <a:t>At least two non-trivial data sets</a:t>
+              <a:t>What areas are you interested in?  E.g. social good or a job demo.</a:t>
             </a:r>
             <a:endParaRPr/>
           </a:p>
@@ -9886,25 +8691,60 @@
             </a:pPr>
             <a:r>
               <a:rPr lang="en"/>
-              <a:t>Data need to be combined, joined, merged, etc.</a:t>
+              <a:t>What data are available in that space?</a:t>
             </a:r>
             <a:endParaRPr/>
           </a:p>
           <a:p>
-            <a:pPr indent="0" lvl="0" marL="0" rtl="0" algn="l">
-              <a:spcBef>
-                <a:spcPts val="1200"/>
-              </a:spcBef>
-              <a:spcAft>
-                <a:spcPts val="1200"/>
-              </a:spcAft>
-              <a:buNone/>
+            <a:pPr indent="-342900" lvl="0" marL="457200" rtl="0" algn="l">
+              <a:spcBef>
+                <a:spcPts val="0"/>
+              </a:spcBef>
+              <a:spcAft>
+                <a:spcPts val="0"/>
+              </a:spcAft>
+              <a:buSzPts val="1800"/>
+              <a:buChar char="●"/>
             </a:pPr>
             <a:r>
-              <a:rPr b="1" lang="en" sz="2400"/>
-              <a:t>Think about your data NOW!</a:t>
+              <a:rPr lang="en"/>
+              <a:t>What tools already exist in that space?</a:t>
             </a:r>
-            <a:endParaRPr b="1" sz="2400"/>
+            <a:endParaRPr/>
+          </a:p>
+          <a:p>
+            <a:pPr indent="-342900" lvl="0" marL="457200" rtl="0" algn="l">
+              <a:spcBef>
+                <a:spcPts val="0"/>
+              </a:spcBef>
+              <a:spcAft>
+                <a:spcPts val="0"/>
+              </a:spcAft>
+              <a:buSzPts val="1800"/>
+              <a:buChar char="●"/>
+            </a:pPr>
+            <a:r>
+              <a:rPr lang="en"/>
+              <a:t>What type of project is this? (answer research question, create reusable data, create a tool, other?)</a:t>
+            </a:r>
+            <a:endParaRPr/>
+          </a:p>
+          <a:p>
+            <a:pPr indent="-342900" lvl="0" marL="457200" rtl="0" algn="l">
+              <a:spcBef>
+                <a:spcPts val="0"/>
+              </a:spcBef>
+              <a:spcAft>
+                <a:spcPts val="0"/>
+              </a:spcAft>
+              <a:buSzPts val="1800"/>
+              <a:buChar char="●"/>
+            </a:pPr>
+            <a:r>
+              <a:rPr b="1" lang="en"/>
+              <a:t>Give a one slide, 1 minute project idea pitch at the start of class #5!</a:t>
+            </a:r>
+            <a:endParaRPr b="1"/>
           </a:p>
         </p:txBody>
       </p:sp>
@@ -9916,12 +8756,12 @@
 </p:sld>
 </file>
 
-<file path=ppt/slides/slide18.xml><?xml version="1.0" encoding="utf-8"?>
+<file path=ppt/slides/slide14.xml><?xml version="1.0" encoding="utf-8"?>
 <p:sld xmlns:a="http://schemas.openxmlformats.org/drawingml/2006/main" xmlns:r="http://schemas.openxmlformats.org/officeDocument/2006/relationships" xmlns:mc="http://schemas.openxmlformats.org/markup-compatibility/2006" xmlns:mv="urn:schemas-microsoft-com:mac:vml" xmlns:p="http://schemas.openxmlformats.org/presentationml/2006/main" xmlns:c="http://schemas.openxmlformats.org/drawingml/2006/chart" xmlns:dgm="http://schemas.openxmlformats.org/drawingml/2006/diagram" xmlns:o="urn:schemas-microsoft-com:office:office" xmlns:v="urn:schemas-microsoft-com:vml" xmlns:pvml="urn:schemas-microsoft-com:office:powerpoint" xmlns:com="http://schemas.openxmlformats.org/drawingml/2006/compatibility" xmlns:p14="http://schemas.microsoft.com/office/powerpoint/2010/main" xmlns:p15="http://schemas.microsoft.com/office/powerpoint/2012/main" xmlns:ahyp="http://schemas.microsoft.com/office/drawing/2018/hyperlinkcolor">
   <p:cSld>
     <p:spTree>
       <p:nvGrpSpPr>
-        <p:cNvPr id="200" name="Shape 200"/>
+        <p:cNvPr id="177" name="Shape 177"/>
         <p:cNvGrpSpPr/>
         <p:nvPr/>
       </p:nvGrpSpPr>
@@ -9935,7 +8775,7 @@
       </p:grpSpPr>
       <p:sp>
         <p:nvSpPr>
-          <p:cNvPr id="201" name="Google Shape;201;p30"/>
+          <p:cNvPr id="178" name="Google Shape;178;p26"/>
           <p:cNvSpPr txBox="1"/>
           <p:nvPr>
             <p:ph type="title"/>
@@ -9967,200 +8807,6 @@
             </a:pPr>
             <a:r>
               <a:rPr lang="en"/>
-              <a:t>Project Ideation</a:t>
-            </a:r>
-            <a:endParaRPr/>
-          </a:p>
-        </p:txBody>
-      </p:sp>
-      <p:sp>
-        <p:nvSpPr>
-          <p:cNvPr id="202" name="Google Shape;202;p30"/>
-          <p:cNvSpPr txBox="1"/>
-          <p:nvPr>
-            <p:ph idx="1" type="body"/>
-          </p:nvPr>
-        </p:nvSpPr>
-        <p:spPr>
-          <a:xfrm>
-            <a:off x="311700" y="1152475"/>
-            <a:ext cx="8520600" cy="3416400"/>
-          </a:xfrm>
-          <a:prstGeom prst="rect">
-            <a:avLst/>
-          </a:prstGeom>
-        </p:spPr>
-        <p:txBody>
-          <a:bodyPr anchorCtr="0" anchor="t" bIns="91425" lIns="91425" spcFirstLastPara="1" rIns="91425" wrap="square" tIns="91425">
-            <a:normAutofit/>
-          </a:bodyPr>
-          <a:lstStyle/>
-          <a:p>
-            <a:pPr indent="0" lvl="0" marL="0" rtl="0" algn="l">
-              <a:spcBef>
-                <a:spcPts val="0"/>
-              </a:spcBef>
-              <a:spcAft>
-                <a:spcPts val="0"/>
-              </a:spcAft>
-              <a:buNone/>
-            </a:pPr>
-            <a:r>
-              <a:rPr lang="en"/>
-              <a:t>Over the first few weeks:</a:t>
-            </a:r>
-            <a:endParaRPr/>
-          </a:p>
-          <a:p>
-            <a:pPr indent="-342900" lvl="0" marL="457200" rtl="0" algn="l">
-              <a:spcBef>
-                <a:spcPts val="1200"/>
-              </a:spcBef>
-              <a:spcAft>
-                <a:spcPts val="0"/>
-              </a:spcAft>
-              <a:buSzPts val="1800"/>
-              <a:buChar char="●"/>
-            </a:pPr>
-            <a:r>
-              <a:rPr lang="en"/>
-              <a:t>What areas are you interested in?  E.g. social good or a job demo.</a:t>
-            </a:r>
-            <a:endParaRPr/>
-          </a:p>
-          <a:p>
-            <a:pPr indent="-342900" lvl="0" marL="457200" rtl="0" algn="l">
-              <a:spcBef>
-                <a:spcPts val="0"/>
-              </a:spcBef>
-              <a:spcAft>
-                <a:spcPts val="0"/>
-              </a:spcAft>
-              <a:buSzPts val="1800"/>
-              <a:buChar char="●"/>
-            </a:pPr>
-            <a:r>
-              <a:rPr lang="en"/>
-              <a:t>What data are available in that space?</a:t>
-            </a:r>
-            <a:endParaRPr/>
-          </a:p>
-          <a:p>
-            <a:pPr indent="-342900" lvl="0" marL="457200" rtl="0" algn="l">
-              <a:spcBef>
-                <a:spcPts val="0"/>
-              </a:spcBef>
-              <a:spcAft>
-                <a:spcPts val="0"/>
-              </a:spcAft>
-              <a:buSzPts val="1800"/>
-              <a:buChar char="●"/>
-            </a:pPr>
-            <a:r>
-              <a:rPr lang="en"/>
-              <a:t>What tools already exist in that space?</a:t>
-            </a:r>
-            <a:endParaRPr/>
-          </a:p>
-          <a:p>
-            <a:pPr indent="-342900" lvl="0" marL="457200" rtl="0" algn="l">
-              <a:spcBef>
-                <a:spcPts val="0"/>
-              </a:spcBef>
-              <a:spcAft>
-                <a:spcPts val="0"/>
-              </a:spcAft>
-              <a:buSzPts val="1800"/>
-              <a:buChar char="●"/>
-            </a:pPr>
-            <a:r>
-              <a:rPr lang="en"/>
-              <a:t>What type of project is this? (answer research question, create reusable data, create a tool, other?)</a:t>
-            </a:r>
-            <a:endParaRPr/>
-          </a:p>
-          <a:p>
-            <a:pPr indent="-342900" lvl="0" marL="457200" rtl="0" algn="l">
-              <a:spcBef>
-                <a:spcPts val="0"/>
-              </a:spcBef>
-              <a:spcAft>
-                <a:spcPts val="0"/>
-              </a:spcAft>
-              <a:buSzPts val="1800"/>
-              <a:buChar char="●"/>
-            </a:pPr>
-            <a:r>
-              <a:rPr b="1" lang="en"/>
-              <a:t>Volunteer to g</a:t>
-            </a:r>
-            <a:r>
-              <a:rPr b="1" lang="en"/>
-              <a:t>ive a one slide, 5 minute project idea pitch at the start of class!</a:t>
-            </a:r>
-            <a:endParaRPr b="1"/>
-          </a:p>
-        </p:txBody>
-      </p:sp>
-    </p:spTree>
-  </p:cSld>
-  <p:clrMapOvr>
-    <a:masterClrMapping/>
-  </p:clrMapOvr>
-</p:sld>
-</file>
-
-<file path=ppt/slides/slide19.xml><?xml version="1.0" encoding="utf-8"?>
-<p:sld xmlns:a="http://schemas.openxmlformats.org/drawingml/2006/main" xmlns:r="http://schemas.openxmlformats.org/officeDocument/2006/relationships" xmlns:mc="http://schemas.openxmlformats.org/markup-compatibility/2006" xmlns:mv="urn:schemas-microsoft-com:mac:vml" xmlns:p="http://schemas.openxmlformats.org/presentationml/2006/main" xmlns:c="http://schemas.openxmlformats.org/drawingml/2006/chart" xmlns:dgm="http://schemas.openxmlformats.org/drawingml/2006/diagram" xmlns:o="urn:schemas-microsoft-com:office:office" xmlns:v="urn:schemas-microsoft-com:vml" xmlns:pvml="urn:schemas-microsoft-com:office:powerpoint" xmlns:com="http://schemas.openxmlformats.org/drawingml/2006/compatibility" xmlns:p14="http://schemas.microsoft.com/office/powerpoint/2010/main" xmlns:p15="http://schemas.microsoft.com/office/powerpoint/2012/main" xmlns:ahyp="http://schemas.microsoft.com/office/drawing/2018/hyperlinkcolor">
-  <p:cSld>
-    <p:spTree>
-      <p:nvGrpSpPr>
-        <p:cNvPr id="206" name="Shape 206"/>
-        <p:cNvGrpSpPr/>
-        <p:nvPr/>
-      </p:nvGrpSpPr>
-      <p:grpSpPr>
-        <a:xfrm>
-          <a:off x="0" y="0"/>
-          <a:ext cx="0" cy="0"/>
-          <a:chOff x="0" y="0"/>
-          <a:chExt cx="0" cy="0"/>
-        </a:xfrm>
-      </p:grpSpPr>
-      <p:sp>
-        <p:nvSpPr>
-          <p:cNvPr id="207" name="Google Shape;207;p31"/>
-          <p:cNvSpPr txBox="1"/>
-          <p:nvPr>
-            <p:ph type="title"/>
-          </p:nvPr>
-        </p:nvSpPr>
-        <p:spPr>
-          <a:xfrm>
-            <a:off x="311700" y="445025"/>
-            <a:ext cx="8520600" cy="572700"/>
-          </a:xfrm>
-          <a:prstGeom prst="rect">
-            <a:avLst/>
-          </a:prstGeom>
-        </p:spPr>
-        <p:txBody>
-          <a:bodyPr anchorCtr="0" anchor="t" bIns="91425" lIns="91425" spcFirstLastPara="1" rIns="91425" wrap="square" tIns="91425">
-            <a:normAutofit fontScale="90000"/>
-          </a:bodyPr>
-          <a:lstStyle/>
-          <a:p>
-            <a:pPr indent="0" lvl="0" marL="0" rtl="0" algn="l">
-              <a:spcBef>
-                <a:spcPts val="0"/>
-              </a:spcBef>
-              <a:spcAft>
-                <a:spcPts val="0"/>
-              </a:spcAft>
-              <a:buNone/>
-            </a:pPr>
-            <a:r>
-              <a:rPr lang="en"/>
               <a:t>Academic Integrity</a:t>
             </a:r>
             <a:endParaRPr/>
@@ -10169,7 +8815,7 @@
       </p:sp>
       <p:sp>
         <p:nvSpPr>
-          <p:cNvPr id="208" name="Google Shape;208;p31"/>
+          <p:cNvPr id="179" name="Google Shape;179;p26"/>
           <p:cNvSpPr txBox="1"/>
           <p:nvPr>
             <p:ph idx="1" type="body"/>
@@ -10616,7 +9262,7 @@
         </p:blipFill>
         <p:spPr>
           <a:xfrm>
-            <a:off x="1003013" y="3499330"/>
+            <a:off x="2335863" y="3499342"/>
             <a:ext cx="1963948" cy="1397976"/>
           </a:xfrm>
           <a:prstGeom prst="rect">
@@ -10646,6 +9292,34 @@
           <a:xfrm>
             <a:off x="6231383" y="4142672"/>
             <a:ext cx="1692966" cy="572701"/>
+          </a:xfrm>
+          <a:prstGeom prst="rect">
+            <a:avLst/>
+          </a:prstGeom>
+          <a:noFill/>
+          <a:ln>
+            <a:noFill/>
+          </a:ln>
+        </p:spPr>
+      </p:pic>
+      <p:pic>
+        <p:nvPicPr>
+          <p:cNvPr id="81" name="Google Shape;81;p14"/>
+          <p:cNvPicPr preferRelativeResize="0"/>
+          <p:nvPr/>
+        </p:nvPicPr>
+        <p:blipFill>
+          <a:blip r:embed="rId13">
+            <a:alphaModFix/>
+          </a:blip>
+          <a:stretch>
+            <a:fillRect/>
+          </a:stretch>
+        </p:blipFill>
+        <p:spPr>
+          <a:xfrm>
+            <a:off x="185817" y="3911973"/>
+            <a:ext cx="2387808" cy="572700"/>
           </a:xfrm>
           <a:prstGeom prst="rect">
             <a:avLst/>
@@ -10788,6 +9462,51 @@
                             </p:stCondLst>
                             <p:childTnLst>
                               <p:par>
+                                <p:cTn fill="hold" nodeType="clickEffect" presetClass="entr" presetID="1" presetSubtype="0">
+                                  <p:stCondLst>
+                                    <p:cond delay="0"/>
+                                  </p:stCondLst>
+                                  <p:childTnLst>
+                                    <p:set>
+                                      <p:cBhvr>
+                                        <p:cTn dur="1" fill="hold">
+                                          <p:stCondLst>
+                                            <p:cond delay="0"/>
+                                          </p:stCondLst>
+                                        </p:cTn>
+                                        <p:tgtEl>
+                                          <p:spTgt spid="81"/>
+                                        </p:tgtEl>
+                                        <p:attrNameLst>
+                                          <p:attrName>style.visibility</p:attrName>
+                                        </p:attrNameLst>
+                                      </p:cBhvr>
+                                      <p:to>
+                                        <p:strVal val="visible"/>
+                                      </p:to>
+                                    </p:set>
+                                  </p:childTnLst>
+                                </p:cTn>
+                              </p:par>
+                            </p:childTnLst>
+                          </p:cTn>
+                        </p:par>
+                      </p:childTnLst>
+                    </p:cTn>
+                  </p:par>
+                  <p:par>
+                    <p:cTn fill="hold">
+                      <p:stCondLst>
+                        <p:cond delay="indefinite"/>
+                      </p:stCondLst>
+                      <p:childTnLst>
+                        <p:par>
+                          <p:cTn fill="hold">
+                            <p:stCondLst>
+                              <p:cond delay="0"/>
+                            </p:stCondLst>
+                            <p:childTnLst>
+                              <p:par>
                                 <p:cTn fill="hold" nodeType="clickEffect" presetClass="entr" presetID="10" presetSubtype="0">
                                   <p:stCondLst>
                                     <p:cond delay="0"/>
@@ -10813,7 +9532,7 @@
                                     </p:set>
                                     <p:animEffect filter="fade" transition="in">
                                       <p:cBhvr>
-                                        <p:cTn dur="1000"/>
+                                        <p:cTn dur="1"/>
                                         <p:tgtEl>
                                           <p:spTgt spid="79"/>
                                         </p:tgtEl>
@@ -10964,7 +9683,7 @@
   <p:cSld>
     <p:spTree>
       <p:nvGrpSpPr>
-        <p:cNvPr id="84" name="Shape 84"/>
+        <p:cNvPr id="85" name="Shape 85"/>
         <p:cNvGrpSpPr/>
         <p:nvPr/>
       </p:nvGrpSpPr>
@@ -10978,7 +9697,7 @@
       </p:grpSpPr>
       <p:sp>
         <p:nvSpPr>
-          <p:cNvPr id="85" name="Google Shape;85;p15"/>
+          <p:cNvPr id="86" name="Google Shape;86;p15"/>
           <p:cNvSpPr txBox="1"/>
           <p:nvPr>
             <p:ph type="title"/>
@@ -11018,7 +9737,7 @@
       </p:sp>
       <p:grpSp>
         <p:nvGrpSpPr>
-          <p:cNvPr id="86" name="Google Shape;86;p15"/>
+          <p:cNvPr id="87" name="Google Shape;87;p15"/>
           <p:cNvGrpSpPr/>
           <p:nvPr/>
         </p:nvGrpSpPr>
@@ -11032,7 +9751,7 @@
         </p:grpSpPr>
         <p:pic>
           <p:nvPicPr>
-            <p:cNvPr id="87" name="Google Shape;87;p15"/>
+            <p:cNvPr id="88" name="Google Shape;88;p15"/>
             <p:cNvPicPr preferRelativeResize="0"/>
             <p:nvPr/>
           </p:nvPicPr>
@@ -11059,7 +9778,7 @@
         </p:pic>
         <p:sp>
           <p:nvSpPr>
-            <p:cNvPr id="88" name="Google Shape;88;p15"/>
+            <p:cNvPr id="89" name="Google Shape;89;p15"/>
             <p:cNvSpPr txBox="1"/>
             <p:nvPr/>
           </p:nvSpPr>
@@ -11127,7 +9846,7 @@
                     <a:srgbClr val="595959"/>
                   </a:solidFill>
                 </a:rPr>
-                <a:t>TAs: data scientists</a:t>
+                <a:t>TA: data scientist</a:t>
               </a:r>
               <a:endParaRPr sz="1800">
                 <a:solidFill>
@@ -11140,7 +9859,7 @@
       </p:grpSp>
       <p:grpSp>
         <p:nvGrpSpPr>
-          <p:cNvPr id="89" name="Google Shape;89;p15"/>
+          <p:cNvPr id="90" name="Google Shape;90;p15"/>
           <p:cNvGrpSpPr/>
           <p:nvPr/>
         </p:nvGrpSpPr>
@@ -11154,7 +9873,7 @@
         </p:grpSpPr>
         <p:sp>
           <p:nvSpPr>
-            <p:cNvPr id="90" name="Google Shape;90;p15"/>
+            <p:cNvPr id="91" name="Google Shape;91;p15"/>
             <p:cNvSpPr txBox="1"/>
             <p:nvPr/>
           </p:nvSpPr>
@@ -11207,7 +9926,7 @@
         </p:sp>
         <p:pic>
           <p:nvPicPr>
-            <p:cNvPr id="91" name="Google Shape;91;p15"/>
+            <p:cNvPr id="92" name="Google Shape;92;p15"/>
             <p:cNvPicPr preferRelativeResize="0"/>
             <p:nvPr/>
           </p:nvPicPr>
@@ -11247,7 +9966,7 @@
   <p:cSld>
     <p:spTree>
       <p:nvGrpSpPr>
-        <p:cNvPr id="95" name="Shape 95"/>
+        <p:cNvPr id="96" name="Shape 96"/>
         <p:cNvGrpSpPr/>
         <p:nvPr/>
       </p:nvGrpSpPr>
@@ -11261,7 +9980,7 @@
       </p:grpSpPr>
       <p:sp>
         <p:nvSpPr>
-          <p:cNvPr id="96" name="Google Shape;96;p16"/>
+          <p:cNvPr id="97" name="Google Shape;97;p16"/>
           <p:cNvSpPr txBox="1"/>
           <p:nvPr>
             <p:ph type="title"/>
@@ -11301,7 +10020,7 @@
       </p:sp>
       <p:sp>
         <p:nvSpPr>
-          <p:cNvPr id="97" name="Google Shape;97;p16"/>
+          <p:cNvPr id="98" name="Google Shape;98;p16"/>
           <p:cNvSpPr/>
           <p:nvPr/>
         </p:nvSpPr>
@@ -11352,7 +10071,7 @@
       </p:sp>
       <p:sp>
         <p:nvSpPr>
-          <p:cNvPr id="98" name="Google Shape;98;p16"/>
+          <p:cNvPr id="99" name="Google Shape;99;p16"/>
           <p:cNvSpPr/>
           <p:nvPr/>
         </p:nvSpPr>
@@ -11403,7 +10122,7 @@
       </p:sp>
       <p:sp>
         <p:nvSpPr>
-          <p:cNvPr id="99" name="Google Shape;99;p16"/>
+          <p:cNvPr id="100" name="Google Shape;100;p16"/>
           <p:cNvSpPr txBox="1"/>
           <p:nvPr/>
         </p:nvSpPr>
@@ -11445,7 +10164,7 @@
       </p:sp>
       <p:sp>
         <p:nvSpPr>
-          <p:cNvPr id="100" name="Google Shape;100;p16"/>
+          <p:cNvPr id="101" name="Google Shape;101;p16"/>
           <p:cNvSpPr txBox="1"/>
           <p:nvPr/>
         </p:nvSpPr>
@@ -11487,7 +10206,7 @@
       </p:sp>
       <p:sp>
         <p:nvSpPr>
-          <p:cNvPr id="101" name="Google Shape;101;p16"/>
+          <p:cNvPr id="102" name="Google Shape;102;p16"/>
           <p:cNvSpPr txBox="1"/>
           <p:nvPr/>
         </p:nvSpPr>
@@ -11617,7 +10336,7 @@
       </p:sp>
       <p:sp>
         <p:nvSpPr>
-          <p:cNvPr id="102" name="Google Shape;102;p16"/>
+          <p:cNvPr id="103" name="Google Shape;103;p16"/>
           <p:cNvSpPr txBox="1"/>
           <p:nvPr/>
         </p:nvSpPr>
@@ -11659,7 +10378,7 @@
       </p:sp>
       <p:sp>
         <p:nvSpPr>
-          <p:cNvPr id="103" name="Google Shape;103;p16"/>
+          <p:cNvPr id="104" name="Google Shape;104;p16"/>
           <p:cNvSpPr txBox="1"/>
           <p:nvPr/>
         </p:nvSpPr>
@@ -11701,7 +10420,7 @@
       </p:sp>
       <p:sp>
         <p:nvSpPr>
-          <p:cNvPr id="104" name="Google Shape;104;p16"/>
+          <p:cNvPr id="105" name="Google Shape;105;p16"/>
           <p:cNvSpPr txBox="1"/>
           <p:nvPr/>
         </p:nvSpPr>
@@ -11822,7 +10541,7 @@
                                           </p:stCondLst>
                                         </p:cTn>
                                         <p:tgtEl>
-                                          <p:spTgt spid="101">
+                                          <p:spTgt spid="102">
                                             <p:txEl>
                                               <p:pRg end="0" st="0"/>
                                             </p:txEl>
@@ -11840,7 +10559,7 @@
                                       <p:cBhvr>
                                         <p:cTn dur="1"/>
                                         <p:tgtEl>
-                                          <p:spTgt spid="101">
+                                          <p:spTgt spid="102">
                                             <p:txEl>
                                               <p:pRg end="0" st="0"/>
                                             </p:txEl>
@@ -11883,7 +10602,7 @@
                                           </p:stCondLst>
                                         </p:cTn>
                                         <p:tgtEl>
-                                          <p:spTgt spid="101">
+                                          <p:spTgt spid="102">
                                             <p:txEl>
                                               <p:pRg end="1" st="1"/>
                                             </p:txEl>
@@ -11901,7 +10620,7 @@
                                       <p:cBhvr>
                                         <p:cTn dur="1"/>
                                         <p:tgtEl>
-                                          <p:spTgt spid="101">
+                                          <p:spTgt spid="102">
                                             <p:txEl>
                                               <p:pRg end="1" st="1"/>
                                             </p:txEl>
@@ -11944,7 +10663,7 @@
                                           </p:stCondLst>
                                         </p:cTn>
                                         <p:tgtEl>
-                                          <p:spTgt spid="101">
+                                          <p:spTgt spid="102">
                                             <p:txEl>
                                               <p:pRg end="2" st="2"/>
                                             </p:txEl>
@@ -11962,7 +10681,7 @@
                                       <p:cBhvr>
                                         <p:cTn dur="1"/>
                                         <p:tgtEl>
-                                          <p:spTgt spid="101">
+                                          <p:spTgt spid="102">
                                             <p:txEl>
                                               <p:pRg end="2" st="2"/>
                                             </p:txEl>
@@ -12005,7 +10724,7 @@
                                           </p:stCondLst>
                                         </p:cTn>
                                         <p:tgtEl>
-                                          <p:spTgt spid="101">
+                                          <p:spTgt spid="102">
                                             <p:txEl>
                                               <p:pRg end="3" st="3"/>
                                             </p:txEl>
@@ -12023,7 +10742,7 @@
                                       <p:cBhvr>
                                         <p:cTn dur="1"/>
                                         <p:tgtEl>
-                                          <p:spTgt spid="101">
+                                          <p:spTgt spid="102">
                                             <p:txEl>
                                               <p:pRg end="3" st="3"/>
                                             </p:txEl>
@@ -12066,7 +10785,7 @@
                                           </p:stCondLst>
                                         </p:cTn>
                                         <p:tgtEl>
-                                          <p:spTgt spid="101">
+                                          <p:spTgt spid="102">
                                             <p:txEl>
                                               <p:pRg end="4" st="4"/>
                                             </p:txEl>
@@ -12084,7 +10803,7 @@
                                       <p:cBhvr>
                                         <p:cTn dur="1"/>
                                         <p:tgtEl>
-                                          <p:spTgt spid="101">
+                                          <p:spTgt spid="102">
                                             <p:txEl>
                                               <p:pRg end="4" st="4"/>
                                             </p:txEl>
@@ -12127,7 +10846,7 @@
                                           </p:stCondLst>
                                         </p:cTn>
                                         <p:tgtEl>
-                                          <p:spTgt spid="101">
+                                          <p:spTgt spid="102">
                                             <p:txEl>
                                               <p:pRg end="5" st="5"/>
                                             </p:txEl>
@@ -12145,7 +10864,7 @@
                                       <p:cBhvr>
                                         <p:cTn dur="1"/>
                                         <p:tgtEl>
-                                          <p:spTgt spid="101">
+                                          <p:spTgt spid="102">
                                             <p:txEl>
                                               <p:pRg end="5" st="5"/>
                                             </p:txEl>
@@ -12188,7 +10907,7 @@
                                           </p:stCondLst>
                                         </p:cTn>
                                         <p:tgtEl>
-                                          <p:spTgt spid="104"/>
+                                          <p:spTgt spid="105"/>
                                         </p:tgtEl>
                                         <p:attrNameLst>
                                           <p:attrName>style.visibility</p:attrName>
@@ -12202,7 +10921,7 @@
                                       <p:cBhvr>
                                         <p:cTn dur="1"/>
                                         <p:tgtEl>
-                                          <p:spTgt spid="104"/>
+                                          <p:spTgt spid="105"/>
                                         </p:tgtEl>
                                       </p:cBhvr>
                                     </p:animEffect>
@@ -12245,7 +10964,7 @@
   <p:cSld>
     <p:spTree>
       <p:nvGrpSpPr>
-        <p:cNvPr id="108" name="Shape 108"/>
+        <p:cNvPr id="109" name="Shape 109"/>
         <p:cNvGrpSpPr/>
         <p:nvPr/>
       </p:nvGrpSpPr>
@@ -12259,7 +10978,7 @@
       </p:grpSpPr>
       <p:sp>
         <p:nvSpPr>
-          <p:cNvPr id="109" name="Google Shape;109;p17"/>
+          <p:cNvPr id="110" name="Google Shape;110;p17"/>
           <p:cNvSpPr txBox="1"/>
           <p:nvPr>
             <p:ph type="title"/>
@@ -12299,7 +11018,7 @@
       </p:sp>
       <p:pic>
         <p:nvPicPr>
-          <p:cNvPr id="110" name="Google Shape;110;p17"/>
+          <p:cNvPr id="111" name="Google Shape;111;p17"/>
           <p:cNvPicPr preferRelativeResize="0"/>
           <p:nvPr/>
         </p:nvPicPr>
@@ -12327,7 +11046,7 @@
       </p:pic>
       <p:sp>
         <p:nvSpPr>
-          <p:cNvPr id="111" name="Google Shape;111;p17"/>
+          <p:cNvPr id="112" name="Google Shape;112;p17"/>
           <p:cNvSpPr txBox="1"/>
           <p:nvPr>
             <p:ph idx="1" type="body"/>
@@ -12437,7 +11156,7 @@
   <p:cSld>
     <p:spTree>
       <p:nvGrpSpPr>
-        <p:cNvPr id="115" name="Shape 115"/>
+        <p:cNvPr id="116" name="Shape 116"/>
         <p:cNvGrpSpPr/>
         <p:nvPr/>
       </p:nvGrpSpPr>
@@ -12451,7 +11170,7 @@
       </p:grpSpPr>
       <p:sp>
         <p:nvSpPr>
-          <p:cNvPr id="116" name="Google Shape;116;p18"/>
+          <p:cNvPr id="117" name="Google Shape;117;p18"/>
           <p:cNvSpPr txBox="1"/>
           <p:nvPr>
             <p:ph type="title"/>
@@ -12491,7 +11210,7 @@
       </p:sp>
       <p:sp>
         <p:nvSpPr>
-          <p:cNvPr id="117" name="Google Shape;117;p18"/>
+          <p:cNvPr id="118" name="Google Shape;118;p18"/>
           <p:cNvSpPr txBox="1"/>
           <p:nvPr>
             <p:ph idx="1" type="body"/>
@@ -12570,13 +11289,29 @@
                 <a:spcPts val="1200"/>
               </a:spcBef>
               <a:spcAft>
-                <a:spcPts val="1200"/>
+                <a:spcPts val="0"/>
               </a:spcAft>
               <a:buNone/>
             </a:pPr>
             <a:r>
               <a:rPr lang="en" sz="2600"/>
               <a:t>+ Ed Discussions</a:t>
+            </a:r>
+            <a:endParaRPr sz="2600"/>
+          </a:p>
+          <a:p>
+            <a:pPr indent="457200" lvl="0" marL="0" rtl="0" algn="l">
+              <a:spcBef>
+                <a:spcPts val="1200"/>
+              </a:spcBef>
+              <a:spcAft>
+                <a:spcPts val="1200"/>
+              </a:spcAft>
+              <a:buNone/>
+            </a:pPr>
+            <a:r>
+              <a:rPr lang="en" sz="2600"/>
+              <a:t>4 hours, with breaks between topics</a:t>
             </a:r>
             <a:endParaRPr sz="2600"/>
           </a:p>
@@ -12595,7 +11330,7 @@
   <p:cSld>
     <p:spTree>
       <p:nvGrpSpPr>
-        <p:cNvPr id="121" name="Shape 121"/>
+        <p:cNvPr id="122" name="Shape 122"/>
         <p:cNvGrpSpPr/>
         <p:nvPr/>
       </p:nvGrpSpPr>
@@ -12609,7 +11344,7 @@
       </p:grpSpPr>
       <p:sp>
         <p:nvSpPr>
-          <p:cNvPr id="122" name="Google Shape;122;p19"/>
+          <p:cNvPr id="123" name="Google Shape;123;p19"/>
           <p:cNvSpPr txBox="1"/>
           <p:nvPr>
             <p:ph type="title"/>
@@ -12649,7 +11384,7 @@
       </p:sp>
       <p:sp>
         <p:nvSpPr>
-          <p:cNvPr id="123" name="Google Shape;123;p19"/>
+          <p:cNvPr id="124" name="Google Shape;124;p19"/>
           <p:cNvSpPr txBox="1"/>
           <p:nvPr>
             <p:ph idx="1" type="body"/>
@@ -12724,7 +11459,7 @@
       </p:sp>
       <p:pic>
         <p:nvPicPr>
-          <p:cNvPr id="124" name="Google Shape;124;p19"/>
+          <p:cNvPr id="125" name="Google Shape;125;p19"/>
           <p:cNvPicPr preferRelativeResize="0"/>
           <p:nvPr/>
         </p:nvPicPr>
@@ -12752,7 +11487,7 @@
       </p:pic>
       <p:pic>
         <p:nvPicPr>
-          <p:cNvPr id="125" name="Google Shape;125;p19"/>
+          <p:cNvPr id="126" name="Google Shape;126;p19"/>
           <p:cNvPicPr preferRelativeResize="0"/>
           <p:nvPr/>
         </p:nvPicPr>
@@ -12791,7 +11526,7 @@
   <p:cSld>
     <p:spTree>
       <p:nvGrpSpPr>
-        <p:cNvPr id="129" name="Shape 129"/>
+        <p:cNvPr id="130" name="Shape 130"/>
         <p:cNvGrpSpPr/>
         <p:nvPr/>
       </p:nvGrpSpPr>
@@ -12805,7 +11540,7 @@
       </p:grpSpPr>
       <p:sp>
         <p:nvSpPr>
-          <p:cNvPr id="130" name="Google Shape;130;p20"/>
+          <p:cNvPr id="131" name="Google Shape;131;p20"/>
           <p:cNvSpPr txBox="1"/>
           <p:nvPr>
             <p:ph type="title"/>
@@ -12845,7 +11580,7 @@
       </p:sp>
       <p:sp>
         <p:nvSpPr>
-          <p:cNvPr id="131" name="Google Shape;131;p20"/>
+          <p:cNvPr id="132" name="Google Shape;132;p20"/>
           <p:cNvSpPr txBox="1"/>
           <p:nvPr>
             <p:ph idx="1" type="body"/>
@@ -13021,7 +11756,7 @@
   <p:cSld>
     <p:spTree>
       <p:nvGrpSpPr>
-        <p:cNvPr id="135" name="Shape 135"/>
+        <p:cNvPr id="136" name="Shape 136"/>
         <p:cNvGrpSpPr/>
         <p:nvPr/>
       </p:nvGrpSpPr>
@@ -13035,7 +11770,7 @@
       </p:grpSpPr>
       <p:sp>
         <p:nvSpPr>
-          <p:cNvPr id="136" name="Google Shape;136;p21"/>
+          <p:cNvPr id="137" name="Google Shape;137;p21"/>
           <p:cNvSpPr txBox="1"/>
           <p:nvPr>
             <p:ph type="title"/>
@@ -13067,7 +11802,7 @@
             </a:pPr>
             <a:r>
               <a:rPr lang="en"/>
-              <a:t>Project Type 1: Answer “Research” Questions</a:t>
+              <a:t>Course Project Types</a:t>
             </a:r>
             <a:endParaRPr/>
           </a:p>
@@ -13075,7 +11810,7 @@
       </p:sp>
       <p:sp>
         <p:nvSpPr>
-          <p:cNvPr id="137" name="Google Shape;137;p21"/>
+          <p:cNvPr id="138" name="Google Shape;138;p21"/>
           <p:cNvSpPr txBox="1"/>
           <p:nvPr>
             <p:ph idx="1" type="body"/>
@@ -13096,89 +11831,72 @@
           </a:bodyPr>
           <a:lstStyle/>
           <a:p>
-            <a:pPr indent="0" lvl="0" marL="0" rtl="0" algn="l">
-              <a:spcBef>
-                <a:spcPts val="0"/>
-              </a:spcBef>
-              <a:spcAft>
-                <a:spcPts val="0"/>
-              </a:spcAft>
-              <a:buClr>
-                <a:schemeClr val="dk1"/>
-              </a:buClr>
-              <a:buSzPts val="1100"/>
-              <a:buFont typeface="Arial"/>
-              <a:buNone/>
+            <a:pPr indent="-368300" lvl="0" marL="457200" rtl="0" algn="l">
+              <a:spcBef>
+                <a:spcPts val="0"/>
+              </a:spcBef>
+              <a:spcAft>
+                <a:spcPts val="0"/>
+              </a:spcAft>
+              <a:buSzPts val="2200"/>
+              <a:buAutoNum type="arabicPeriod"/>
             </a:pPr>
             <a:r>
-              <a:rPr lang="en"/>
-              <a:t>Problem statement: Answer two to three questions of business or scientific relevance</a:t>
+              <a:rPr lang="en" sz="2200"/>
+              <a:t>Answer “Research” Questions</a:t>
             </a:r>
-            <a:endParaRPr/>
+            <a:endParaRPr sz="2200"/>
           </a:p>
           <a:p>
-            <a:pPr indent="-342900" lvl="0" marL="457200" rtl="0" algn="l">
-              <a:spcBef>
-                <a:spcPts val="1200"/>
-              </a:spcBef>
-              <a:spcAft>
-                <a:spcPts val="0"/>
-              </a:spcAft>
-              <a:buSzPts val="1800"/>
-              <a:buChar char="●"/>
+            <a:pPr indent="-368300" lvl="0" marL="457200" rtl="0" algn="l">
+              <a:spcBef>
+                <a:spcPts val="0"/>
+              </a:spcBef>
+              <a:spcAft>
+                <a:spcPts val="0"/>
+              </a:spcAft>
+              <a:buSzPts val="2200"/>
+              <a:buAutoNum type="arabicPeriod"/>
             </a:pPr>
             <a:r>
-              <a:rPr lang="en"/>
-              <a:t>Use a Jupyter notebook and supporting python files</a:t>
+              <a:rPr lang="en" sz="2200"/>
+              <a:t>Create a Tool</a:t>
             </a:r>
-            <a:endParaRPr/>
+            <a:endParaRPr sz="2200"/>
           </a:p>
           <a:p>
-            <a:pPr indent="0" lvl="0" marL="0" rtl="0" algn="l">
-              <a:spcBef>
-                <a:spcPts val="1200"/>
-              </a:spcBef>
-              <a:spcAft>
-                <a:spcPts val="0"/>
-              </a:spcAft>
-              <a:buClr>
-                <a:schemeClr val="dk1"/>
-              </a:buClr>
-              <a:buSzPts val="1100"/>
-              <a:buFont typeface="Arial"/>
-              <a:buNone/>
+            <a:pPr indent="-368300" lvl="0" marL="457200" rtl="0" algn="l">
+              <a:spcBef>
+                <a:spcPts val="0"/>
+              </a:spcBef>
+              <a:spcAft>
+                <a:spcPts val="0"/>
+              </a:spcAft>
+              <a:buSzPts val="2200"/>
+              <a:buAutoNum type="arabicPeriod"/>
             </a:pPr>
             <a:r>
-              <a:rPr lang="en"/>
-              <a:t>Example</a:t>
+              <a:rPr lang="en" sz="2200"/>
+              <a:t>Teach Analysis</a:t>
             </a:r>
-            <a:endParaRPr/>
+            <a:endParaRPr sz="2200"/>
           </a:p>
           <a:p>
-            <a:pPr indent="-342900" lvl="0" marL="457200" rtl="0" algn="l">
-              <a:spcBef>
-                <a:spcPts val="1200"/>
-              </a:spcBef>
-              <a:spcAft>
-                <a:spcPts val="0"/>
-              </a:spcAft>
-              <a:buSzPts val="1800"/>
-              <a:buChar char="●"/>
+            <a:pPr indent="-368300" lvl="0" marL="457200" rtl="0" algn="l">
+              <a:spcBef>
+                <a:spcPts val="0"/>
+              </a:spcBef>
+              <a:spcAft>
+                <a:spcPts val="0"/>
+              </a:spcAft>
+              <a:buSzPts val="2200"/>
+              <a:buAutoNum type="arabicPeriod"/>
             </a:pPr>
             <a:r>
-              <a:rPr lang="en" u="sng">
-                <a:solidFill>
-                  <a:schemeClr val="hlink"/>
-                </a:solidFill>
-                <a:hlinkClick r:id="rId3"/>
-              </a:rPr>
-              <a:t>Climate Police</a:t>
+              <a:rPr lang="en" sz="2200"/>
+              <a:t>Present Data</a:t>
             </a:r>
-            <a:r>
-              <a:rPr lang="en"/>
-              <a:t>: Analyze effects of pollution on the planet.</a:t>
-            </a:r>
-            <a:endParaRPr/>
+            <a:endParaRPr sz="2200"/>
           </a:p>
         </p:txBody>
       </p:sp>
@@ -13191,6 +11909,285 @@
 </file>
 
 <file path=ppt/theme/theme1.xml><?xml version="1.0" encoding="utf-8"?>
+<a:theme xmlns:a="http://schemas.openxmlformats.org/drawingml/2006/main" xmlns:r="http://schemas.openxmlformats.org/officeDocument/2006/relationships" name="Simple Light">
+  <a:themeElements>
+    <a:clrScheme name="Simple Light">
+      <a:dk1>
+        <a:srgbClr val="000000"/>
+      </a:dk1>
+      <a:lt1>
+        <a:srgbClr val="FFFFFF"/>
+      </a:lt1>
+      <a:dk2>
+        <a:srgbClr val="595959"/>
+      </a:dk2>
+      <a:lt2>
+        <a:srgbClr val="EEEEEE"/>
+      </a:lt2>
+      <a:accent1>
+        <a:srgbClr val="4285F4"/>
+      </a:accent1>
+      <a:accent2>
+        <a:srgbClr val="212121"/>
+      </a:accent2>
+      <a:accent3>
+        <a:srgbClr val="78909C"/>
+      </a:accent3>
+      <a:accent4>
+        <a:srgbClr val="FFAB40"/>
+      </a:accent4>
+      <a:accent5>
+        <a:srgbClr val="0097A7"/>
+      </a:accent5>
+      <a:accent6>
+        <a:srgbClr val="EEFF41"/>
+      </a:accent6>
+      <a:hlink>
+        <a:srgbClr val="0097A7"/>
+      </a:hlink>
+      <a:folHlink>
+        <a:srgbClr val="0097A7"/>
+      </a:folHlink>
+    </a:clrScheme>
+    <a:fontScheme name="Office">
+      <a:majorFont>
+        <a:latin typeface="Arial"/>
+        <a:ea typeface=""/>
+        <a:cs typeface=""/>
+        <a:font script="Jpan" typeface="ＭＳ Ｐゴシック"/>
+        <a:font script="Hang" typeface="맑은 고딕"/>
+        <a:font script="Hans" typeface="宋体"/>
+        <a:font script="Hant" typeface="新細明體"/>
+        <a:font script="Arab" typeface="Times New Roman"/>
+        <a:font script="Hebr" typeface="Times New Roman"/>
+        <a:font script="Thai" typeface="Angsana New"/>
+        <a:font script="Ethi" typeface="Nyala"/>
+        <a:font script="Beng" typeface="Vrinda"/>
+        <a:font script="Gujr" typeface="Shruti"/>
+        <a:font script="Khmr" typeface="MoolBoran"/>
+        <a:font script="Knda" typeface="Tunga"/>
+        <a:font script="Guru" typeface="Raavi"/>
+        <a:font script="Cans" typeface="Euphemia"/>
+        <a:font script="Cher" typeface="Plantagenet Cherokee"/>
+        <a:font script="Yiii" typeface="Microsoft Yi Baiti"/>
+        <a:font script="Tibt" typeface="Microsoft Himalaya"/>
+        <a:font script="Thaa" typeface="MV Boli"/>
+        <a:font script="Deva" typeface="Mangal"/>
+        <a:font script="Telu" typeface="Gautami"/>
+        <a:font script="Taml" typeface="Latha"/>
+        <a:font script="Syrc" typeface="Estrangelo Edessa"/>
+        <a:font script="Orya" typeface="Kalinga"/>
+        <a:font script="Mlym" typeface="Kartika"/>
+        <a:font script="Laoo" typeface="DokChampa"/>
+        <a:font script="Sinh" typeface="Iskoola Pota"/>
+        <a:font script="Mong" typeface="Mongolian Baiti"/>
+        <a:font script="Viet" typeface="Times New Roman"/>
+        <a:font script="Uigh" typeface="Microsoft Uighur"/>
+        <a:font script="Geor" typeface="Sylfaen"/>
+      </a:majorFont>
+      <a:minorFont>
+        <a:latin typeface="Arial"/>
+        <a:ea typeface=""/>
+        <a:cs typeface=""/>
+        <a:font script="Jpan" typeface="ＭＳ Ｐゴシック"/>
+        <a:font script="Hang" typeface="맑은 고딕"/>
+        <a:font script="Hans" typeface="宋体"/>
+        <a:font script="Hant" typeface="新細明體"/>
+        <a:font script="Arab" typeface="Arial"/>
+        <a:font script="Hebr" typeface="Arial"/>
+        <a:font script="Thai" typeface="Cordia New"/>
+        <a:font script="Ethi" typeface="Nyala"/>
+        <a:font script="Beng" typeface="Vrinda"/>
+        <a:font script="Gujr" typeface="Shruti"/>
+        <a:font script="Khmr" typeface="DaunPenh"/>
+        <a:font script="Knda" typeface="Tunga"/>
+        <a:font script="Guru" typeface="Raavi"/>
+        <a:font script="Cans" typeface="Euphemia"/>
+        <a:font script="Cher" typeface="Plantagenet Cherokee"/>
+        <a:font script="Yiii" typeface="Microsoft Yi Baiti"/>
+        <a:font script="Tibt" typeface="Microsoft Himalaya"/>
+        <a:font script="Thaa" typeface="MV Boli"/>
+        <a:font script="Deva" typeface="Mangal"/>
+        <a:font script="Telu" typeface="Gautami"/>
+        <a:font script="Taml" typeface="Latha"/>
+        <a:font script="Syrc" typeface="Estrangelo Edessa"/>
+        <a:font script="Orya" typeface="Kalinga"/>
+        <a:font script="Mlym" typeface="Kartika"/>
+        <a:font script="Laoo" typeface="DokChampa"/>
+        <a:font script="Sinh" typeface="Iskoola Pota"/>
+        <a:font script="Mong" typeface="Mongolian Baiti"/>
+        <a:font script="Viet" typeface="Arial"/>
+        <a:font script="Uigh" typeface="Microsoft Uighur"/>
+        <a:font script="Geor" typeface="Sylfaen"/>
+      </a:minorFont>
+    </a:fontScheme>
+    <a:fmtScheme name="Office">
+      <a:fillStyleLst>
+        <a:solidFill>
+          <a:schemeClr val="phClr"/>
+        </a:solidFill>
+        <a:gradFill rotWithShape="1">
+          <a:gsLst>
+            <a:gs pos="0">
+              <a:schemeClr val="phClr">
+                <a:tint val="50000"/>
+                <a:satMod val="300000"/>
+              </a:schemeClr>
+            </a:gs>
+            <a:gs pos="35000">
+              <a:schemeClr val="phClr">
+                <a:tint val="37000"/>
+                <a:satMod val="300000"/>
+              </a:schemeClr>
+            </a:gs>
+            <a:gs pos="100000">
+              <a:schemeClr val="phClr">
+                <a:tint val="15000"/>
+                <a:satMod val="350000"/>
+              </a:schemeClr>
+            </a:gs>
+          </a:gsLst>
+          <a:lin ang="16200000" scaled="1"/>
+        </a:gradFill>
+        <a:gradFill rotWithShape="1">
+          <a:gsLst>
+            <a:gs pos="0">
+              <a:schemeClr val="phClr">
+                <a:tint val="100000"/>
+                <a:shade val="100000"/>
+                <a:satMod val="130000"/>
+              </a:schemeClr>
+            </a:gs>
+            <a:gs pos="100000">
+              <a:schemeClr val="phClr">
+                <a:tint val="50000"/>
+                <a:shade val="100000"/>
+                <a:satMod val="350000"/>
+              </a:schemeClr>
+            </a:gs>
+          </a:gsLst>
+          <a:lin ang="16200000" scaled="0"/>
+        </a:gradFill>
+      </a:fillStyleLst>
+      <a:lnStyleLst>
+        <a:ln w="9525" cap="flat" cmpd="sng" algn="ctr">
+          <a:solidFill>
+            <a:schemeClr val="phClr">
+              <a:shade val="95000"/>
+              <a:satMod val="105000"/>
+            </a:schemeClr>
+          </a:solidFill>
+          <a:prstDash val="solid"/>
+        </a:ln>
+        <a:ln w="25400" cap="flat" cmpd="sng" algn="ctr">
+          <a:solidFill>
+            <a:schemeClr val="phClr"/>
+          </a:solidFill>
+          <a:prstDash val="solid"/>
+        </a:ln>
+        <a:ln w="38100" cap="flat" cmpd="sng" algn="ctr">
+          <a:solidFill>
+            <a:schemeClr val="phClr"/>
+          </a:solidFill>
+          <a:prstDash val="solid"/>
+        </a:ln>
+      </a:lnStyleLst>
+      <a:effectStyleLst>
+        <a:effectStyle>
+          <a:effectLst>
+            <a:outerShdw blurRad="40000" dist="20000" dir="5400000" rotWithShape="0">
+              <a:srgbClr val="000000">
+                <a:alpha val="38000"/>
+              </a:srgbClr>
+            </a:outerShdw>
+          </a:effectLst>
+        </a:effectStyle>
+        <a:effectStyle>
+          <a:effectLst>
+            <a:outerShdw blurRad="40000" dist="23000" dir="5400000" rotWithShape="0">
+              <a:srgbClr val="000000">
+                <a:alpha val="35000"/>
+              </a:srgbClr>
+            </a:outerShdw>
+          </a:effectLst>
+        </a:effectStyle>
+        <a:effectStyle>
+          <a:effectLst>
+            <a:outerShdw blurRad="40000" dist="23000" dir="5400000" rotWithShape="0">
+              <a:srgbClr val="000000">
+                <a:alpha val="35000"/>
+              </a:srgbClr>
+            </a:outerShdw>
+          </a:effectLst>
+          <a:scene3d>
+            <a:camera prst="orthographicFront">
+              <a:rot lat="0" lon="0" rev="0"/>
+            </a:camera>
+            <a:lightRig rig="threePt" dir="t">
+              <a:rot lat="0" lon="0" rev="1200000"/>
+            </a:lightRig>
+          </a:scene3d>
+          <a:sp3d>
+            <a:bevelT w="63500" h="25400"/>
+          </a:sp3d>
+        </a:effectStyle>
+      </a:effectStyleLst>
+      <a:bgFillStyleLst>
+        <a:solidFill>
+          <a:schemeClr val="phClr"/>
+        </a:solidFill>
+        <a:gradFill rotWithShape="1">
+          <a:gsLst>
+            <a:gs pos="0">
+              <a:schemeClr val="phClr">
+                <a:tint val="40000"/>
+                <a:satMod val="350000"/>
+              </a:schemeClr>
+            </a:gs>
+            <a:gs pos="40000">
+              <a:schemeClr val="phClr">
+                <a:tint val="45000"/>
+                <a:shade val="99000"/>
+                <a:satMod val="350000"/>
+              </a:schemeClr>
+            </a:gs>
+            <a:gs pos="100000">
+              <a:schemeClr val="phClr">
+                <a:shade val="20000"/>
+                <a:satMod val="255000"/>
+              </a:schemeClr>
+            </a:gs>
+          </a:gsLst>
+          <a:path path="circle">
+            <a:fillToRect l="50000" t="-80000" r="50000" b="180000"/>
+          </a:path>
+        </a:gradFill>
+        <a:gradFill rotWithShape="1">
+          <a:gsLst>
+            <a:gs pos="0">
+              <a:schemeClr val="phClr">
+                <a:tint val="80000"/>
+                <a:satMod val="300000"/>
+              </a:schemeClr>
+            </a:gs>
+            <a:gs pos="100000">
+              <a:schemeClr val="phClr">
+                <a:shade val="30000"/>
+                <a:satMod val="200000"/>
+              </a:schemeClr>
+            </a:gs>
+          </a:gsLst>
+          <a:path path="circle">
+            <a:fillToRect l="50000" t="50000" r="50000" b="50000"/>
+          </a:path>
+        </a:gradFill>
+      </a:bgFillStyleLst>
+    </a:fmtScheme>
+  </a:themeElements>
+</a:theme>
+</file>
+
+<file path=ppt/theme/theme2.xml><?xml version="1.0" encoding="utf-8"?>
 <a:theme xmlns:a="http://schemas.openxmlformats.org/drawingml/2006/main" xmlns:r="http://schemas.openxmlformats.org/officeDocument/2006/relationships">
   <a:themeElements>
     <a:clrScheme name="Default">
@@ -13467,283 +12464,4 @@
     </a:fmtScheme>
   </a:themeElements>
 </a:theme>
-</file>
-
-<file path=ppt/theme/theme2.xml><?xml version="1.0" encoding="utf-8"?>
-<a:theme xmlns:a="http://schemas.openxmlformats.org/drawingml/2006/main" xmlns:r="http://schemas.openxmlformats.org/officeDocument/2006/relationships" name="Simple Light">
-  <a:themeElements>
-    <a:clrScheme name="Simple Light">
-      <a:dk1>
-        <a:srgbClr val="000000"/>
-      </a:dk1>
-      <a:lt1>
-        <a:srgbClr val="FFFFFF"/>
-      </a:lt1>
-      <a:dk2>
-        <a:srgbClr val="595959"/>
-      </a:dk2>
-      <a:lt2>
-        <a:srgbClr val="EEEEEE"/>
-      </a:lt2>
-      <a:accent1>
-        <a:srgbClr val="4285F4"/>
-      </a:accent1>
-      <a:accent2>
-        <a:srgbClr val="212121"/>
-      </a:accent2>
-      <a:accent3>
-        <a:srgbClr val="78909C"/>
-      </a:accent3>
-      <a:accent4>
-        <a:srgbClr val="FFAB40"/>
-      </a:accent4>
-      <a:accent5>
-        <a:srgbClr val="0097A7"/>
-      </a:accent5>
-      <a:accent6>
-        <a:srgbClr val="EEFF41"/>
-      </a:accent6>
-      <a:hlink>
-        <a:srgbClr val="0097A7"/>
-      </a:hlink>
-      <a:folHlink>
-        <a:srgbClr val="0097A7"/>
-      </a:folHlink>
-    </a:clrScheme>
-    <a:fontScheme name="Office">
-      <a:majorFont>
-        <a:latin typeface="Arial"/>
-        <a:ea typeface=""/>
-        <a:cs typeface=""/>
-        <a:font script="Jpan" typeface="ＭＳ Ｐゴシック"/>
-        <a:font script="Hang" typeface="맑은 고딕"/>
-        <a:font script="Hans" typeface="宋体"/>
-        <a:font script="Hant" typeface="新細明體"/>
-        <a:font script="Arab" typeface="Times New Roman"/>
-        <a:font script="Hebr" typeface="Times New Roman"/>
-        <a:font script="Thai" typeface="Angsana New"/>
-        <a:font script="Ethi" typeface="Nyala"/>
-        <a:font script="Beng" typeface="Vrinda"/>
-        <a:font script="Gujr" typeface="Shruti"/>
-        <a:font script="Khmr" typeface="MoolBoran"/>
-        <a:font script="Knda" typeface="Tunga"/>
-        <a:font script="Guru" typeface="Raavi"/>
-        <a:font script="Cans" typeface="Euphemia"/>
-        <a:font script="Cher" typeface="Plantagenet Cherokee"/>
-        <a:font script="Yiii" typeface="Microsoft Yi Baiti"/>
-        <a:font script="Tibt" typeface="Microsoft Himalaya"/>
-        <a:font script="Thaa" typeface="MV Boli"/>
-        <a:font script="Deva" typeface="Mangal"/>
-        <a:font script="Telu" typeface="Gautami"/>
-        <a:font script="Taml" typeface="Latha"/>
-        <a:font script="Syrc" typeface="Estrangelo Edessa"/>
-        <a:font script="Orya" typeface="Kalinga"/>
-        <a:font script="Mlym" typeface="Kartika"/>
-        <a:font script="Laoo" typeface="DokChampa"/>
-        <a:font script="Sinh" typeface="Iskoola Pota"/>
-        <a:font script="Mong" typeface="Mongolian Baiti"/>
-        <a:font script="Viet" typeface="Times New Roman"/>
-        <a:font script="Uigh" typeface="Microsoft Uighur"/>
-        <a:font script="Geor" typeface="Sylfaen"/>
-      </a:majorFont>
-      <a:minorFont>
-        <a:latin typeface="Arial"/>
-        <a:ea typeface=""/>
-        <a:cs typeface=""/>
-        <a:font script="Jpan" typeface="ＭＳ Ｐゴシック"/>
-        <a:font script="Hang" typeface="맑은 고딕"/>
-        <a:font script="Hans" typeface="宋体"/>
-        <a:font script="Hant" typeface="新細明體"/>
-        <a:font script="Arab" typeface="Arial"/>
-        <a:font script="Hebr" typeface="Arial"/>
-        <a:font script="Thai" typeface="Cordia New"/>
-        <a:font script="Ethi" typeface="Nyala"/>
-        <a:font script="Beng" typeface="Vrinda"/>
-        <a:font script="Gujr" typeface="Shruti"/>
-        <a:font script="Khmr" typeface="DaunPenh"/>
-        <a:font script="Knda" typeface="Tunga"/>
-        <a:font script="Guru" typeface="Raavi"/>
-        <a:font script="Cans" typeface="Euphemia"/>
-        <a:font script="Cher" typeface="Plantagenet Cherokee"/>
-        <a:font script="Yiii" typeface="Microsoft Yi Baiti"/>
-        <a:font script="Tibt" typeface="Microsoft Himalaya"/>
-        <a:font script="Thaa" typeface="MV Boli"/>
-        <a:font script="Deva" typeface="Mangal"/>
-        <a:font script="Telu" typeface="Gautami"/>
-        <a:font script="Taml" typeface="Latha"/>
-        <a:font script="Syrc" typeface="Estrangelo Edessa"/>
-        <a:font script="Orya" typeface="Kalinga"/>
-        <a:font script="Mlym" typeface="Kartika"/>
-        <a:font script="Laoo" typeface="DokChampa"/>
-        <a:font script="Sinh" typeface="Iskoola Pota"/>
-        <a:font script="Mong" typeface="Mongolian Baiti"/>
-        <a:font script="Viet" typeface="Arial"/>
-        <a:font script="Uigh" typeface="Microsoft Uighur"/>
-        <a:font script="Geor" typeface="Sylfaen"/>
-      </a:minorFont>
-    </a:fontScheme>
-    <a:fmtScheme name="Office">
-      <a:fillStyleLst>
-        <a:solidFill>
-          <a:schemeClr val="phClr"/>
-        </a:solidFill>
-        <a:gradFill rotWithShape="1">
-          <a:gsLst>
-            <a:gs pos="0">
-              <a:schemeClr val="phClr">
-                <a:tint val="50000"/>
-                <a:satMod val="300000"/>
-              </a:schemeClr>
-            </a:gs>
-            <a:gs pos="35000">
-              <a:schemeClr val="phClr">
-                <a:tint val="37000"/>
-                <a:satMod val="300000"/>
-              </a:schemeClr>
-            </a:gs>
-            <a:gs pos="100000">
-              <a:schemeClr val="phClr">
-                <a:tint val="15000"/>
-                <a:satMod val="350000"/>
-              </a:schemeClr>
-            </a:gs>
-          </a:gsLst>
-          <a:lin ang="16200000" scaled="1"/>
-        </a:gradFill>
-        <a:gradFill rotWithShape="1">
-          <a:gsLst>
-            <a:gs pos="0">
-              <a:schemeClr val="phClr">
-                <a:tint val="100000"/>
-                <a:shade val="100000"/>
-                <a:satMod val="130000"/>
-              </a:schemeClr>
-            </a:gs>
-            <a:gs pos="100000">
-              <a:schemeClr val="phClr">
-                <a:tint val="50000"/>
-                <a:shade val="100000"/>
-                <a:satMod val="350000"/>
-              </a:schemeClr>
-            </a:gs>
-          </a:gsLst>
-          <a:lin ang="16200000" scaled="0"/>
-        </a:gradFill>
-      </a:fillStyleLst>
-      <a:lnStyleLst>
-        <a:ln w="9525" cap="flat" cmpd="sng" algn="ctr">
-          <a:solidFill>
-            <a:schemeClr val="phClr">
-              <a:shade val="95000"/>
-              <a:satMod val="105000"/>
-            </a:schemeClr>
-          </a:solidFill>
-          <a:prstDash val="solid"/>
-        </a:ln>
-        <a:ln w="25400" cap="flat" cmpd="sng" algn="ctr">
-          <a:solidFill>
-            <a:schemeClr val="phClr"/>
-          </a:solidFill>
-          <a:prstDash val="solid"/>
-        </a:ln>
-        <a:ln w="38100" cap="flat" cmpd="sng" algn="ctr">
-          <a:solidFill>
-            <a:schemeClr val="phClr"/>
-          </a:solidFill>
-          <a:prstDash val="solid"/>
-        </a:ln>
-      </a:lnStyleLst>
-      <a:effectStyleLst>
-        <a:effectStyle>
-          <a:effectLst>
-            <a:outerShdw blurRad="40000" dist="20000" dir="5400000" rotWithShape="0">
-              <a:srgbClr val="000000">
-                <a:alpha val="38000"/>
-              </a:srgbClr>
-            </a:outerShdw>
-          </a:effectLst>
-        </a:effectStyle>
-        <a:effectStyle>
-          <a:effectLst>
-            <a:outerShdw blurRad="40000" dist="23000" dir="5400000" rotWithShape="0">
-              <a:srgbClr val="000000">
-                <a:alpha val="35000"/>
-              </a:srgbClr>
-            </a:outerShdw>
-          </a:effectLst>
-        </a:effectStyle>
-        <a:effectStyle>
-          <a:effectLst>
-            <a:outerShdw blurRad="40000" dist="23000" dir="5400000" rotWithShape="0">
-              <a:srgbClr val="000000">
-                <a:alpha val="35000"/>
-              </a:srgbClr>
-            </a:outerShdw>
-          </a:effectLst>
-          <a:scene3d>
-            <a:camera prst="orthographicFront">
-              <a:rot lat="0" lon="0" rev="0"/>
-            </a:camera>
-            <a:lightRig rig="threePt" dir="t">
-              <a:rot lat="0" lon="0" rev="1200000"/>
-            </a:lightRig>
-          </a:scene3d>
-          <a:sp3d>
-            <a:bevelT w="63500" h="25400"/>
-          </a:sp3d>
-        </a:effectStyle>
-      </a:effectStyleLst>
-      <a:bgFillStyleLst>
-        <a:solidFill>
-          <a:schemeClr val="phClr"/>
-        </a:solidFill>
-        <a:gradFill rotWithShape="1">
-          <a:gsLst>
-            <a:gs pos="0">
-              <a:schemeClr val="phClr">
-                <a:tint val="40000"/>
-                <a:satMod val="350000"/>
-              </a:schemeClr>
-            </a:gs>
-            <a:gs pos="40000">
-              <a:schemeClr val="phClr">
-                <a:tint val="45000"/>
-                <a:shade val="99000"/>
-                <a:satMod val="350000"/>
-              </a:schemeClr>
-            </a:gs>
-            <a:gs pos="100000">
-              <a:schemeClr val="phClr">
-                <a:shade val="20000"/>
-                <a:satMod val="255000"/>
-              </a:schemeClr>
-            </a:gs>
-          </a:gsLst>
-          <a:path path="circle">
-            <a:fillToRect l="50000" t="-80000" r="50000" b="180000"/>
-          </a:path>
-        </a:gradFill>
-        <a:gradFill rotWithShape="1">
-          <a:gsLst>
-            <a:gs pos="0">
-              <a:schemeClr val="phClr">
-                <a:tint val="80000"/>
-                <a:satMod val="300000"/>
-              </a:schemeClr>
-            </a:gs>
-            <a:gs pos="100000">
-              <a:schemeClr val="phClr">
-                <a:shade val="30000"/>
-                <a:satMod val="200000"/>
-              </a:schemeClr>
-            </a:gs>
-          </a:gsLst>
-          <a:path path="circle">
-            <a:fillToRect l="50000" t="50000" r="50000" b="50000"/>
-          </a:path>
-        </a:gradFill>
-      </a:bgFillStyleLst>
-    </a:fmtScheme>
-  </a:themeElements>
-</a:theme>
 </file>
</xml_diff>

<commit_message>
L1: More slide deck updates
</commit_message>
<xml_diff>
--- a/01/DATA515_01_Introduction.pptx
+++ b/01/DATA515_01_Introduction.pptx
@@ -7702,10 +7702,10 @@
               <a:buNone/>
             </a:pPr>
             <a:r>
-              <a:rPr lang="en"/>
+              <a:rPr lang="en" dirty="0"/>
               <a:t>Introduction</a:t>
             </a:r>
-            <a:endParaRPr/>
+            <a:endParaRPr dirty="0"/>
           </a:p>
         </p:txBody>
       </p:sp>
@@ -7730,7 +7730,7 @@
         </p:spPr>
         <p:txBody>
           <a:bodyPr spcFirstLastPara="1" wrap="square" lIns="91425" tIns="91425" rIns="91425" bIns="91425" anchor="t" anchorCtr="0">
-            <a:normAutofit fontScale="77500" lnSpcReduction="20000"/>
+            <a:normAutofit fontScale="92500" lnSpcReduction="20000"/>
           </a:bodyPr>
           <a:lstStyle/>
           <a:p>
@@ -7744,10 +7744,10 @@
               <a:buNone/>
             </a:pPr>
             <a:r>
-              <a:rPr lang="en-US" dirty="0"/>
+              <a:rPr lang="en-US" sz="1600" dirty="0"/>
               <a:t>Naomi Alterman</a:t>
             </a:r>
-            <a:endParaRPr dirty="0"/>
+            <a:endParaRPr sz="1600" dirty="0"/>
           </a:p>
           <a:p>
             <a:pPr marL="0" lvl="0" indent="0" algn="ctr" rtl="0">
@@ -7760,10 +7760,10 @@
               <a:buNone/>
             </a:pPr>
             <a:r>
-              <a:rPr lang="en" dirty="0"/>
+              <a:rPr lang="en" sz="1600" dirty="0"/>
               <a:t>University of Washington</a:t>
             </a:r>
-            <a:endParaRPr dirty="0"/>
+            <a:endParaRPr sz="1600" dirty="0"/>
           </a:p>
           <a:p>
             <a:pPr marL="0" lvl="0" indent="0" algn="ctr" rtl="0">
@@ -7776,10 +7776,10 @@
               <a:buNone/>
             </a:pPr>
             <a:r>
-              <a:rPr lang="en" dirty="0"/>
-              <a:t>January 6, 2025</a:t>
+              <a:rPr lang="en" sz="1600" dirty="0"/>
+              <a:t>January 5, 2026</a:t>
             </a:r>
-            <a:endParaRPr dirty="0"/>
+            <a:endParaRPr sz="1600" dirty="0"/>
           </a:p>
         </p:txBody>
       </p:sp>

</xml_diff>